<commit_message>
2025 Annual Update with QRcode
Signed-off-by: Weber (US), Matthew L <matthew.l.weber3@boeing.com>
</commit_message>
<xml_diff>
--- a/presentations/ELISA-aerospace-wg-updates-2025.pptx
+++ b/presentations/ELISA-aerospace-wg-updates-2025.pptx
@@ -810,6 +810,54 @@
             <a:noAutofit/>
           </a:bodyPr>
           <a:lstStyle/>
+          <a:p>
+            <a:pPr marL="0" marR="0"/>
+            <a:r>
+              <a:rPr lang="en-US" sz="1800" kern="100" dirty="0">
+                <a:effectLst/>
+                <a:latin typeface="Calibri" panose="020F0502020204030204" pitchFamily="34" charset="0"/>
+                <a:ea typeface="Times New Roman" panose="02020603050405020304" pitchFamily="18" charset="0"/>
+                <a:cs typeface="Times New Roman" panose="02020603050405020304" pitchFamily="18" charset="0"/>
+              </a:rPr>
+              <a:t>10 minutes retrospective</a:t>
+            </a:r>
+          </a:p>
+          <a:p>
+            <a:pPr marL="0" marR="0"/>
+            <a:r>
+              <a:rPr lang="en-US" sz="1800" kern="100" dirty="0">
+                <a:effectLst/>
+                <a:latin typeface="Calibri" panose="020F0502020204030204" pitchFamily="34" charset="0"/>
+                <a:ea typeface="Times New Roman" panose="02020603050405020304" pitchFamily="18" charset="0"/>
+                <a:cs typeface="Times New Roman" panose="02020603050405020304" pitchFamily="18" charset="0"/>
+              </a:rPr>
+              <a:t>10 minutes looking forward</a:t>
+            </a:r>
+          </a:p>
+          <a:p>
+            <a:pPr marL="0" marR="0"/>
+            <a:r>
+              <a:rPr lang="en-US" sz="1800" kern="100" dirty="0">
+                <a:effectLst/>
+                <a:latin typeface="Calibri" panose="020F0502020204030204" pitchFamily="34" charset="0"/>
+                <a:ea typeface="Times New Roman" panose="02020603050405020304" pitchFamily="18" charset="0"/>
+                <a:cs typeface="Times New Roman" panose="02020603050405020304" pitchFamily="18" charset="0"/>
+              </a:rPr>
+              <a:t>5 minutes call to action / Q&amp;A.</a:t>
+            </a:r>
+          </a:p>
+          <a:p>
+            <a:pPr marL="0" marR="0"/>
+            <a:r>
+              <a:rPr lang="en-US" sz="1800" kern="100" dirty="0">
+                <a:effectLst/>
+                <a:latin typeface="Calibri" panose="020F0502020204030204" pitchFamily="34" charset="0"/>
+                <a:ea typeface="Times New Roman" panose="02020603050405020304" pitchFamily="18" charset="0"/>
+                <a:cs typeface="Times New Roman" panose="02020603050405020304" pitchFamily="18" charset="0"/>
+              </a:rPr>
+              <a:t>Thank Steve</a:t>
+            </a:r>
+          </a:p>
           <a:p>
             <a:pPr marL="0" lvl="0" indent="0" algn="l" rtl="0">
               <a:spcBef>
@@ -4510,6 +4558,36 @@
           </a:p>
         </p:txBody>
       </p:sp>
+      <p:pic>
+        <p:nvPicPr>
+          <p:cNvPr id="3" name="Picture 2">
+            <a:extLst>
+              <a:ext uri="{FF2B5EF4-FFF2-40B4-BE49-F238E27FC236}">
+                <a16:creationId xmlns:a16="http://schemas.microsoft.com/office/drawing/2014/main" id="{82788077-864B-AC07-3BE4-7F00FA906745}"/>
+              </a:ext>
+            </a:extLst>
+          </p:cNvPr>
+          <p:cNvPicPr>
+            <a:picLocks noChangeAspect="1"/>
+          </p:cNvPicPr>
+          <p:nvPr/>
+        </p:nvPicPr>
+        <p:blipFill>
+          <a:blip r:embed="rId3"/>
+          <a:stretch>
+            <a:fillRect/>
+          </a:stretch>
+        </p:blipFill>
+        <p:spPr>
+          <a:xfrm>
+            <a:off x="7913815" y="145338"/>
+            <a:ext cx="912497" cy="912497"/>
+          </a:xfrm>
+          <a:prstGeom prst="rect">
+            <a:avLst/>
+          </a:prstGeom>
+        </p:spPr>
+      </p:pic>
     </p:spTree>
   </p:cSld>
   <p:clrMapOvr>
@@ -4962,6 +5040,36 @@
           </a:p>
         </p:txBody>
       </p:sp>
+      <p:pic>
+        <p:nvPicPr>
+          <p:cNvPr id="2" name="Picture 1">
+            <a:extLst>
+              <a:ext uri="{FF2B5EF4-FFF2-40B4-BE49-F238E27FC236}">
+                <a16:creationId xmlns:a16="http://schemas.microsoft.com/office/drawing/2014/main" id="{D7480085-EDC4-C29B-F4C1-558C35C2FE2C}"/>
+              </a:ext>
+            </a:extLst>
+          </p:cNvPr>
+          <p:cNvPicPr>
+            <a:picLocks noChangeAspect="1"/>
+          </p:cNvPicPr>
+          <p:nvPr/>
+        </p:nvPicPr>
+        <p:blipFill>
+          <a:blip r:embed="rId3"/>
+          <a:stretch>
+            <a:fillRect/>
+          </a:stretch>
+        </p:blipFill>
+        <p:spPr>
+          <a:xfrm>
+            <a:off x="7913815" y="145338"/>
+            <a:ext cx="912497" cy="912497"/>
+          </a:xfrm>
+          <a:prstGeom prst="rect">
+            <a:avLst/>
+          </a:prstGeom>
+        </p:spPr>
+      </p:pic>
     </p:spTree>
   </p:cSld>
   <p:clrMapOvr>
@@ -5110,30 +5218,7 @@
                 <a:ea typeface="Roboto" panose="02000000000000000000" pitchFamily="2" charset="0"/>
                 <a:cs typeface="Roboto" panose="02000000000000000000" pitchFamily="2" charset="0"/>
               </a:rPr>
-              <a:t>61</a:t>
-            </a:r>
-            <a:r>
-              <a:rPr lang="en-US" b="0" i="0" u="none" strike="noStrike" baseline="0" dirty="0">
-                <a:solidFill>
-                  <a:srgbClr val="434343"/>
-                </a:solidFill>
-                <a:latin typeface="Roboto" panose="02000000000000000000" pitchFamily="2" charset="0"/>
-                <a:ea typeface="Roboto" panose="02000000000000000000" pitchFamily="2" charset="0"/>
-                <a:cs typeface="Roboto" panose="02000000000000000000" pitchFamily="2" charset="0"/>
-                <a:sym typeface="Wingdings" panose="05000000000000000000" pitchFamily="2" charset="2"/>
-              </a:rPr>
-              <a:t></a:t>
-            </a:r>
-            <a:r>
-              <a:rPr lang="en-US" b="0" i="0" u="none" strike="noStrike" baseline="0" dirty="0">
-                <a:solidFill>
-                  <a:srgbClr val="434343"/>
-                </a:solidFill>
-                <a:latin typeface="Roboto" panose="02000000000000000000" pitchFamily="2" charset="0"/>
-                <a:ea typeface="Roboto" panose="02000000000000000000" pitchFamily="2" charset="0"/>
-                <a:cs typeface="Roboto" panose="02000000000000000000" pitchFamily="2" charset="0"/>
-              </a:rPr>
-              <a:t> 45 members</a:t>
+              <a:t>45 unique members attended meetings</a:t>
             </a:r>
             <a:endParaRPr lang="en-US" dirty="0">
               <a:latin typeface="Roboto" panose="02000000000000000000" pitchFamily="2" charset="0"/>
@@ -5296,7 +5381,41 @@
                 <a:ea typeface="Roboto" panose="02000000000000000000" pitchFamily="2" charset="0"/>
                 <a:cs typeface="Roboto" panose="02000000000000000000" pitchFamily="2" charset="0"/>
               </a:rPr>
-              <a:t>Drafted architecture, requirements and test for the </a:t>
+              <a:t>Drafted </a:t>
+            </a:r>
+            <a:r>
+              <a:rPr lang="en-US" dirty="0">
+                <a:latin typeface="Roboto" panose="02000000000000000000" pitchFamily="2" charset="0"/>
+                <a:ea typeface="Roboto" panose="02000000000000000000" pitchFamily="2" charset="0"/>
+                <a:cs typeface="Roboto" panose="02000000000000000000" pitchFamily="2" charset="0"/>
+                <a:hlinkClick r:id="rId3"/>
+              </a:rPr>
+              <a:t>architecture, requirements </a:t>
+            </a:r>
+            <a:r>
+              <a:rPr lang="en-US" dirty="0">
+                <a:latin typeface="Roboto" panose="02000000000000000000" pitchFamily="2" charset="0"/>
+                <a:ea typeface="Roboto" panose="02000000000000000000" pitchFamily="2" charset="0"/>
+                <a:cs typeface="Roboto" panose="02000000000000000000" pitchFamily="2" charset="0"/>
+              </a:rPr>
+              <a:t>and </a:t>
+            </a:r>
+            <a:r>
+              <a:rPr lang="en-US" dirty="0">
+                <a:latin typeface="Roboto" panose="02000000000000000000" pitchFamily="2" charset="0"/>
+                <a:ea typeface="Roboto" panose="02000000000000000000" pitchFamily="2" charset="0"/>
+                <a:cs typeface="Roboto" panose="02000000000000000000" pitchFamily="2" charset="0"/>
+                <a:hlinkClick r:id="rId4"/>
+              </a:rPr>
+              <a:t>test</a:t>
+            </a:r>
+            <a:r>
+              <a:rPr lang="en-US" dirty="0">
+                <a:latin typeface="Roboto" panose="02000000000000000000" pitchFamily="2" charset="0"/>
+                <a:ea typeface="Roboto" panose="02000000000000000000" pitchFamily="2" charset="0"/>
+                <a:cs typeface="Roboto" panose="02000000000000000000" pitchFamily="2" charset="0"/>
+              </a:rPr>
+              <a:t> for the </a:t>
             </a:r>
             <a:r>
               <a:rPr lang="en-US" b="1" dirty="0">
@@ -5339,37 +5458,52 @@
                 <a:ea typeface="Roboto" panose="02000000000000000000" pitchFamily="2" charset="0"/>
                 <a:cs typeface="Roboto" panose="02000000000000000000" pitchFamily="2" charset="0"/>
               </a:rPr>
-              <a:t>Formation of Space Grade Linux (SGL) Special Interest Group(SIG)</a:t>
-            </a:r>
-          </a:p>
-          <a:p>
-            <a:pPr marL="742950" lvl="1" indent="-285750">
-              <a:spcAft>
-                <a:spcPts val="800"/>
-              </a:spcAft>
-            </a:pPr>
+              <a:t>Formation of </a:t>
+            </a:r>
             <a:r>
               <a:rPr lang="en-US" dirty="0">
                 <a:latin typeface="Roboto" panose="02000000000000000000" pitchFamily="2" charset="0"/>
                 <a:ea typeface="Roboto" panose="02000000000000000000" pitchFamily="2" charset="0"/>
                 <a:cs typeface="Roboto" panose="02000000000000000000" pitchFamily="2" charset="0"/>
-              </a:rPr>
-              <a:t>Thank you Ramon Roche and Ivan Perez (NASA Ames) for volunteering to lead this!</a:t>
-            </a:r>
-          </a:p>
-          <a:p>
-            <a:pPr marL="742950" lvl="1" indent="-285750">
-              <a:spcAft>
-                <a:spcPts val="800"/>
-              </a:spcAft>
-            </a:pPr>
+                <a:hlinkClick r:id="rId5"/>
+              </a:rPr>
+              <a:t>Space Grade Linux (SGL) Special Interest Group(SIG)</a:t>
+            </a:r>
             <a:r>
               <a:rPr lang="en-US" dirty="0">
                 <a:latin typeface="Roboto" panose="02000000000000000000" pitchFamily="2" charset="0"/>
                 <a:ea typeface="Roboto" panose="02000000000000000000" pitchFamily="2" charset="0"/>
                 <a:cs typeface="Roboto" panose="02000000000000000000" pitchFamily="2" charset="0"/>
               </a:rPr>
-              <a:t>Surveyed aerospace and space community to drive SIG direction</a:t>
+              <a:t> </a:t>
+            </a:r>
+            <a:r>
+              <a:rPr lang="en-US" sz="1200" dirty="0">
+                <a:latin typeface="Roboto" panose="02000000000000000000" pitchFamily="2" charset="0"/>
+                <a:ea typeface="Roboto" panose="02000000000000000000" pitchFamily="2" charset="0"/>
+                <a:cs typeface="Roboto" panose="02000000000000000000" pitchFamily="2" charset="0"/>
+              </a:rPr>
+              <a:t>(https://elisa.tech/space-grade-linux-sig/)</a:t>
+            </a:r>
+            <a:endParaRPr lang="en-US" dirty="0">
+              <a:latin typeface="Roboto" panose="02000000000000000000" pitchFamily="2" charset="0"/>
+              <a:ea typeface="Roboto" panose="02000000000000000000" pitchFamily="2" charset="0"/>
+              <a:cs typeface="Roboto" panose="02000000000000000000" pitchFamily="2" charset="0"/>
+            </a:endParaRPr>
+          </a:p>
+          <a:p>
+            <a:pPr marL="742950" lvl="1" indent="-285750">
+              <a:spcAft>
+                <a:spcPts val="800"/>
+              </a:spcAft>
+            </a:pPr>
+            <a:r>
+              <a:rPr lang="en-US" dirty="0">
+                <a:latin typeface="Roboto" panose="02000000000000000000" pitchFamily="2" charset="0"/>
+                <a:ea typeface="Roboto" panose="02000000000000000000" pitchFamily="2" charset="0"/>
+                <a:cs typeface="Roboto" panose="02000000000000000000" pitchFamily="2" charset="0"/>
+              </a:rPr>
+              <a:t>Thank you Ramon Roche and Ivan Perez (NASA Ames) for leading this!</a:t>
             </a:r>
           </a:p>
           <a:p>
@@ -5645,6 +5779,36 @@
           </a:p>
         </p:txBody>
       </p:sp>
+      <p:pic>
+        <p:nvPicPr>
+          <p:cNvPr id="2" name="Picture 1">
+            <a:extLst>
+              <a:ext uri="{FF2B5EF4-FFF2-40B4-BE49-F238E27FC236}">
+                <a16:creationId xmlns:a16="http://schemas.microsoft.com/office/drawing/2014/main" id="{B87FF560-04A4-215C-CB0C-690CEC6D5F2B}"/>
+              </a:ext>
+            </a:extLst>
+          </p:cNvPr>
+          <p:cNvPicPr>
+            <a:picLocks noChangeAspect="1"/>
+          </p:cNvPicPr>
+          <p:nvPr/>
+        </p:nvPicPr>
+        <p:blipFill>
+          <a:blip r:embed="rId6"/>
+          <a:stretch>
+            <a:fillRect/>
+          </a:stretch>
+        </p:blipFill>
+        <p:spPr>
+          <a:xfrm>
+            <a:off x="7913815" y="145338"/>
+            <a:ext cx="912497" cy="912497"/>
+          </a:xfrm>
+          <a:prstGeom prst="rect">
+            <a:avLst/>
+          </a:prstGeom>
+        </p:spPr>
+      </p:pic>
     </p:spTree>
     <p:extLst>
       <p:ext uri="{BB962C8B-B14F-4D97-AF65-F5344CB8AC3E}">
@@ -5795,7 +5959,7 @@
                 <a:ea typeface="Roboto" panose="02000000000000000000" pitchFamily="2" charset="0"/>
                 <a:cs typeface="Roboto" panose="02000000000000000000" pitchFamily="2" charset="0"/>
               </a:rPr>
-              <a:t> (Dec)</a:t>
+              <a:t> – “Forming an ecosystem around open source in space!” (Dec)</a:t>
             </a:r>
           </a:p>
           <a:p>
@@ -5810,18 +5974,110 @@
                 <a:ea typeface="Roboto" panose="02000000000000000000" pitchFamily="2" charset="0"/>
                 <a:cs typeface="Roboto" panose="02000000000000000000" pitchFamily="2" charset="0"/>
               </a:rPr>
-              <a:t>Linux Foundation EOSS (Apr) - </a:t>
-            </a:r>
-            <a:r>
-              <a:rPr lang="en-US" dirty="0">
+              <a:t>Linux Foundation Plumbers (Sept)</a:t>
+            </a:r>
+          </a:p>
+          <a:p>
+            <a:pPr marL="1200150" lvl="2" indent="-285750">
+              <a:spcBef>
+                <a:spcPts val="100"/>
+              </a:spcBef>
+              <a:spcAft>
+                <a:spcPts val="100"/>
+              </a:spcAft>
+            </a:pPr>
+            <a:r>
+              <a:rPr lang="en-US" b="0" i="0" dirty="0">
+                <a:solidFill>
+                  <a:srgbClr val="6A8A25"/>
+                </a:solidFill>
+                <a:effectLst/>
+                <a:latin typeface="Dosis" panose="020F0502020204030204" pitchFamily="2" charset="0"/>
+                <a:hlinkClick r:id="rId4"/>
+              </a:rPr>
+              <a:t>Improving kernel design documentation and involving experts</a:t>
+            </a:r>
+            <a:endParaRPr lang="en-US" b="0" i="0" dirty="0">
+              <a:solidFill>
+                <a:srgbClr val="6A8A25"/>
+              </a:solidFill>
+              <a:effectLst/>
+              <a:latin typeface="Dosis" pitchFamily="2" charset="0"/>
+              <a:hlinkClick r:id="rId5"/>
+            </a:endParaRPr>
+          </a:p>
+          <a:p>
+            <a:pPr marL="1200150" lvl="2" indent="-285750">
+              <a:spcBef>
+                <a:spcPts val="100"/>
+              </a:spcBef>
+              <a:spcAft>
+                <a:spcPts val="100"/>
+              </a:spcAft>
+            </a:pPr>
+            <a:r>
+              <a:rPr lang="en-US" b="0" i="0" dirty="0">
+                <a:solidFill>
+                  <a:srgbClr val="6A8A25"/>
+                </a:solidFill>
+                <a:effectLst/>
+                <a:latin typeface="Dosis" pitchFamily="2" charset="0"/>
+                <a:hlinkClick r:id="rId5"/>
+              </a:rPr>
+              <a:t>Making Linux Fly: Towards a Certified Linux Kernel</a:t>
+            </a:r>
+            <a:endParaRPr lang="en-US" b="0" i="0" dirty="0">
+              <a:solidFill>
+                <a:srgbClr val="6A8A25"/>
+              </a:solidFill>
+              <a:effectLst/>
+              <a:latin typeface="Dosis" panose="020F0502020204030204" pitchFamily="2" charset="0"/>
+              <a:hlinkClick r:id="rId4"/>
+            </a:endParaRPr>
+          </a:p>
+          <a:p>
+            <a:pPr marL="1200150" lvl="2" indent="-285750">
+              <a:spcBef>
+                <a:spcPts val="100"/>
+              </a:spcBef>
+              <a:spcAft>
+                <a:spcPts val="100"/>
+              </a:spcAft>
+            </a:pPr>
+            <a:r>
+              <a:rPr lang="en-US" b="0" i="0" dirty="0">
+                <a:solidFill>
+                  <a:srgbClr val="CB6D04"/>
+                </a:solidFill>
+                <a:effectLst/>
+                <a:latin typeface="Dosis" pitchFamily="2" charset="0"/>
+                <a:hlinkClick r:id="rId6"/>
+              </a:rPr>
+              <a:t>Source-based code coverage of Linux kernel</a:t>
+            </a:r>
+            <a:r>
+              <a:rPr lang="en-US" b="0" i="0" dirty="0">
+                <a:solidFill>
+                  <a:srgbClr val="CB6D04"/>
+                </a:solidFill>
+                <a:effectLst/>
+                <a:latin typeface="Dosis" pitchFamily="2" charset="0"/>
+              </a:rPr>
+              <a:t> </a:t>
+            </a:r>
+            <a:r>
+              <a:rPr lang="en-US" sz="1200" b="0" i="0" dirty="0">
+                <a:solidFill>
+                  <a:srgbClr val="001D35"/>
+                </a:solidFill>
+                <a:effectLst/>
                 <a:latin typeface="Roboto" panose="02000000000000000000" pitchFamily="2" charset="0"/>
                 <a:ea typeface="Roboto" panose="02000000000000000000" pitchFamily="2" charset="0"/>
                 <a:cs typeface="Roboto" panose="02000000000000000000" pitchFamily="2" charset="0"/>
-                <a:hlinkClick r:id="rId4"/>
-              </a:rPr>
-              <a:t>“Measuring Code Coverage of the Linux Kernel in Accordance with RTCA DO-178C Considerations,”</a:t>
-            </a:r>
-            <a:endParaRPr lang="en-US" dirty="0">
+              </a:rPr>
+              <a:t>(Modified Condition/Decision Coverage (MC/DC))</a:t>
+            </a:r>
+            <a:endParaRPr lang="en-US" sz="1200" dirty="0">
               <a:latin typeface="Roboto" panose="02000000000000000000" pitchFamily="2" charset="0"/>
               <a:ea typeface="Roboto" panose="02000000000000000000" pitchFamily="2" charset="0"/>
               <a:cs typeface="Roboto" panose="02000000000000000000" pitchFamily="2" charset="0"/>
@@ -5839,91 +6095,25 @@
                 <a:ea typeface="Roboto" panose="02000000000000000000" pitchFamily="2" charset="0"/>
                 <a:cs typeface="Roboto" panose="02000000000000000000" pitchFamily="2" charset="0"/>
               </a:rPr>
-              <a:t>Linux Foundation Plumbers (Sept)</a:t>
-            </a:r>
-          </a:p>
-          <a:p>
-            <a:pPr marL="1200150" lvl="2" indent="-285750">
-              <a:spcBef>
-                <a:spcPts val="100"/>
-              </a:spcBef>
-              <a:spcAft>
-                <a:spcPts val="100"/>
-              </a:spcAft>
-            </a:pPr>
-            <a:r>
-              <a:rPr lang="en-US" b="0" i="0" dirty="0">
-                <a:solidFill>
-                  <a:srgbClr val="6A8A25"/>
-                </a:solidFill>
-                <a:effectLst/>
-                <a:latin typeface="Dosis" pitchFamily="2" charset="0"/>
-                <a:hlinkClick r:id="rId5"/>
-              </a:rPr>
-              <a:t>Making Linux Fly: Towards a Certified Linux Kernel</a:t>
-            </a:r>
-            <a:endParaRPr lang="en-US" b="0" i="0" dirty="0">
-              <a:solidFill>
-                <a:srgbClr val="6A8A25"/>
-              </a:solidFill>
-              <a:effectLst/>
-              <a:latin typeface="Dosis" panose="020F0502020204030204" pitchFamily="2" charset="0"/>
-              <a:hlinkClick r:id="rId6"/>
-            </a:endParaRPr>
-          </a:p>
-          <a:p>
-            <a:pPr marL="1200150" lvl="2" indent="-285750">
-              <a:spcBef>
-                <a:spcPts val="100"/>
-              </a:spcBef>
-              <a:spcAft>
-                <a:spcPts val="100"/>
-              </a:spcAft>
-            </a:pPr>
-            <a:r>
-              <a:rPr lang="en-US" b="0" i="0" dirty="0">
-                <a:solidFill>
-                  <a:srgbClr val="6A8A25"/>
-                </a:solidFill>
-                <a:effectLst/>
-                <a:latin typeface="Dosis" panose="020F0502020204030204" pitchFamily="2" charset="0"/>
-                <a:hlinkClick r:id="rId6"/>
-              </a:rPr>
-              <a:t>Improving kernel design documentation and involving experts</a:t>
-            </a:r>
-            <a:endParaRPr lang="en-US" b="0" i="0" dirty="0">
-              <a:solidFill>
-                <a:srgbClr val="6A8A25"/>
-              </a:solidFill>
-              <a:effectLst/>
-              <a:latin typeface="Dosis" panose="020F0502020204030204" pitchFamily="2" charset="0"/>
-            </a:endParaRPr>
-          </a:p>
-          <a:p>
-            <a:pPr marL="1200150" lvl="2" indent="-285750">
-              <a:spcBef>
-                <a:spcPts val="100"/>
-              </a:spcBef>
-              <a:spcAft>
-                <a:spcPts val="100"/>
-              </a:spcAft>
-            </a:pPr>
-            <a:r>
-              <a:rPr lang="en-US" b="0" i="0" dirty="0">
-                <a:solidFill>
-                  <a:srgbClr val="CB6D04"/>
-                </a:solidFill>
-                <a:effectLst/>
-                <a:latin typeface="Dosis" pitchFamily="2" charset="0"/>
+              <a:t>Linux Foundation EOSS - </a:t>
+            </a:r>
+            <a:r>
+              <a:rPr lang="en-US" dirty="0">
+                <a:latin typeface="Roboto" panose="02000000000000000000" pitchFamily="2" charset="0"/>
+                <a:ea typeface="Roboto" panose="02000000000000000000" pitchFamily="2" charset="0"/>
+                <a:cs typeface="Roboto" panose="02000000000000000000" pitchFamily="2" charset="0"/>
                 <a:hlinkClick r:id="rId7"/>
               </a:rPr>
-              <a:t>Source-based code coverage of Linux kernel</a:t>
-            </a:r>
-            <a:endParaRPr lang="en-US" dirty="0">
-              <a:latin typeface="Roboto" panose="02000000000000000000" pitchFamily="2" charset="0"/>
-              <a:ea typeface="Roboto" panose="02000000000000000000" pitchFamily="2" charset="0"/>
-              <a:cs typeface="Roboto" panose="02000000000000000000" pitchFamily="2" charset="0"/>
-            </a:endParaRPr>
+              <a:t>“Measuring Code Coverage of the Linux Kernel in Accordance with RTCA DO-178C Considerations,”</a:t>
+            </a:r>
+            <a:r>
+              <a:rPr lang="en-US" dirty="0">
+                <a:latin typeface="Roboto" panose="02000000000000000000" pitchFamily="2" charset="0"/>
+                <a:ea typeface="Roboto" panose="02000000000000000000" pitchFamily="2" charset="0"/>
+                <a:cs typeface="Roboto" panose="02000000000000000000" pitchFamily="2" charset="0"/>
+              </a:rPr>
+              <a:t> (Apr)</a:t>
+            </a:r>
           </a:p>
           <a:p>
             <a:pPr marL="742950" lvl="1" indent="-285750">
@@ -6242,6 +6432,36 @@
           </a:p>
         </p:txBody>
       </p:sp>
+      <p:pic>
+        <p:nvPicPr>
+          <p:cNvPr id="2" name="Picture 1">
+            <a:extLst>
+              <a:ext uri="{FF2B5EF4-FFF2-40B4-BE49-F238E27FC236}">
+                <a16:creationId xmlns:a16="http://schemas.microsoft.com/office/drawing/2014/main" id="{53F04357-860B-0818-6C75-F0B709F1D8C7}"/>
+              </a:ext>
+            </a:extLst>
+          </p:cNvPr>
+          <p:cNvPicPr>
+            <a:picLocks noChangeAspect="1"/>
+          </p:cNvPicPr>
+          <p:nvPr/>
+        </p:nvPicPr>
+        <p:blipFill>
+          <a:blip r:embed="rId9"/>
+          <a:stretch>
+            <a:fillRect/>
+          </a:stretch>
+        </p:blipFill>
+        <p:spPr>
+          <a:xfrm>
+            <a:off x="7913815" y="145338"/>
+            <a:ext cx="912497" cy="912497"/>
+          </a:xfrm>
+          <a:prstGeom prst="rect">
+            <a:avLst/>
+          </a:prstGeom>
+        </p:spPr>
+      </p:pic>
     </p:spTree>
     <p:extLst>
       <p:ext uri="{BB962C8B-B14F-4D97-AF65-F5344CB8AC3E}">
@@ -6364,7 +6584,24 @@
                 <a:ea typeface="Roboto" panose="02000000000000000000" pitchFamily="2" charset="0"/>
                 <a:cs typeface="Roboto" panose="02000000000000000000" pitchFamily="2" charset="0"/>
               </a:rPr>
-              <a:t>A verification demo of the “Cabin Lighting” use case</a:t>
+              <a:t>A </a:t>
+            </a:r>
+            <a:r>
+              <a:rPr lang="en-US" dirty="0">
+                <a:latin typeface="Roboto" panose="02000000000000000000" pitchFamily="2" charset="0"/>
+                <a:ea typeface="Roboto" panose="02000000000000000000" pitchFamily="2" charset="0"/>
+                <a:cs typeface="Roboto" panose="02000000000000000000" pitchFamily="2" charset="0"/>
+                <a:hlinkClick r:id="rId3"/>
+              </a:rPr>
+              <a:t>verification demo </a:t>
+            </a:r>
+            <a:r>
+              <a:rPr lang="en-US" dirty="0">
+                <a:latin typeface="Roboto" panose="02000000000000000000" pitchFamily="2" charset="0"/>
+                <a:ea typeface="Roboto" panose="02000000000000000000" pitchFamily="2" charset="0"/>
+                <a:cs typeface="Roboto" panose="02000000000000000000" pitchFamily="2" charset="0"/>
+              </a:rPr>
+              <a:t>of the “Cabin Lighting” use case</a:t>
             </a:r>
           </a:p>
           <a:p>
@@ -6383,8 +6620,89 @@
                 <a:ea typeface="Roboto" panose="02000000000000000000" pitchFamily="2" charset="0"/>
                 <a:cs typeface="Roboto" panose="02000000000000000000" pitchFamily="2" charset="0"/>
               </a:rPr>
-              <a:t>Establishing a development license, repositories and automation plan</a:t>
-            </a:r>
+              <a:t>Establishing code repositories</a:t>
+            </a:r>
+          </a:p>
+          <a:p>
+            <a:pPr lvl="1"/>
+            <a:r>
+              <a:rPr lang="en-US" dirty="0">
+                <a:latin typeface="Roboto" panose="02000000000000000000" pitchFamily="2" charset="0"/>
+                <a:ea typeface="Roboto" panose="02000000000000000000" pitchFamily="2" charset="0"/>
+                <a:cs typeface="Roboto" panose="02000000000000000000" pitchFamily="2" charset="0"/>
+              </a:rPr>
+              <a:t>Licensing plan</a:t>
+            </a:r>
+          </a:p>
+          <a:p>
+            <a:pPr lvl="2"/>
+            <a:r>
+              <a:rPr lang="en-US" dirty="0">
+                <a:latin typeface="Roboto" panose="02000000000000000000" pitchFamily="2" charset="0"/>
+                <a:ea typeface="Roboto" panose="02000000000000000000" pitchFamily="2" charset="0"/>
+                <a:cs typeface="Roboto" panose="02000000000000000000" pitchFamily="2" charset="0"/>
+              </a:rPr>
+              <a:t>Space Grade Linux has an example of the CC-BY-SA-4 and MIT license approach (</a:t>
+            </a:r>
+            <a:r>
+              <a:rPr lang="en-US" dirty="0">
+                <a:latin typeface="Roboto" panose="02000000000000000000" pitchFamily="2" charset="0"/>
+                <a:ea typeface="Roboto" panose="02000000000000000000" pitchFamily="2" charset="0"/>
+                <a:cs typeface="Roboto" panose="02000000000000000000" pitchFamily="2" charset="0"/>
+                <a:hlinkClick r:id="rId4"/>
+              </a:rPr>
+              <a:t>https://github.com/elisa-tech/meta-sgl/blob/main/LICENSE</a:t>
+            </a:r>
+            <a:r>
+              <a:rPr lang="en-US" dirty="0">
+                <a:latin typeface="Roboto" panose="02000000000000000000" pitchFamily="2" charset="0"/>
+                <a:ea typeface="Roboto" panose="02000000000000000000" pitchFamily="2" charset="0"/>
+                <a:cs typeface="Roboto" panose="02000000000000000000" pitchFamily="2" charset="0"/>
+              </a:rPr>
+              <a:t>)</a:t>
+            </a:r>
+          </a:p>
+          <a:p>
+            <a:pPr lvl="1"/>
+            <a:r>
+              <a:rPr lang="en-US" dirty="0">
+                <a:latin typeface="Roboto" panose="02000000000000000000" pitchFamily="2" charset="0"/>
+                <a:ea typeface="Roboto" panose="02000000000000000000" pitchFamily="2" charset="0"/>
+                <a:cs typeface="Roboto" panose="02000000000000000000" pitchFamily="2" charset="0"/>
+              </a:rPr>
+              <a:t>Automation plan – Combination of </a:t>
+            </a:r>
+            <a:r>
+              <a:rPr lang="en-US" dirty="0">
+                <a:latin typeface="Roboto" panose="02000000000000000000" pitchFamily="2" charset="0"/>
+                <a:ea typeface="Roboto" panose="02000000000000000000" pitchFamily="2" charset="0"/>
+                <a:cs typeface="Roboto" panose="02000000000000000000" pitchFamily="2" charset="0"/>
+                <a:hlinkClick r:id="rId5"/>
+              </a:rPr>
+              <a:t>GitHub</a:t>
+            </a:r>
+            <a:r>
+              <a:rPr lang="en-US" dirty="0">
+                <a:latin typeface="Roboto" panose="02000000000000000000" pitchFamily="2" charset="0"/>
+                <a:ea typeface="Roboto" panose="02000000000000000000" pitchFamily="2" charset="0"/>
+                <a:cs typeface="Roboto" panose="02000000000000000000" pitchFamily="2" charset="0"/>
+              </a:rPr>
+              <a:t> and </a:t>
+            </a:r>
+            <a:r>
+              <a:rPr lang="en-US" dirty="0">
+                <a:latin typeface="Roboto" panose="02000000000000000000" pitchFamily="2" charset="0"/>
+                <a:ea typeface="Roboto" panose="02000000000000000000" pitchFamily="2" charset="0"/>
+                <a:cs typeface="Roboto" panose="02000000000000000000" pitchFamily="2" charset="0"/>
+                <a:hlinkClick r:id="rId6"/>
+              </a:rPr>
+              <a:t>GitLab</a:t>
+            </a:r>
+            <a:endParaRPr lang="en-US" dirty="0">
+              <a:latin typeface="Roboto" panose="02000000000000000000" pitchFamily="2" charset="0"/>
+              <a:ea typeface="Roboto" panose="02000000000000000000" pitchFamily="2" charset="0"/>
+              <a:cs typeface="Roboto" panose="02000000000000000000" pitchFamily="2" charset="0"/>
+            </a:endParaRPr>
           </a:p>
           <a:p>
             <a:pPr algn="l"/>
@@ -6671,6 +6989,36 @@
           </a:p>
         </p:txBody>
       </p:sp>
+      <p:pic>
+        <p:nvPicPr>
+          <p:cNvPr id="2" name="Picture 1">
+            <a:extLst>
+              <a:ext uri="{FF2B5EF4-FFF2-40B4-BE49-F238E27FC236}">
+                <a16:creationId xmlns:a16="http://schemas.microsoft.com/office/drawing/2014/main" id="{2487FE27-03EB-F49D-6BA4-C16F398F57F5}"/>
+              </a:ext>
+            </a:extLst>
+          </p:cNvPr>
+          <p:cNvPicPr>
+            <a:picLocks noChangeAspect="1"/>
+          </p:cNvPicPr>
+          <p:nvPr/>
+        </p:nvPicPr>
+        <p:blipFill>
+          <a:blip r:embed="rId7"/>
+          <a:stretch>
+            <a:fillRect/>
+          </a:stretch>
+        </p:blipFill>
+        <p:spPr>
+          <a:xfrm>
+            <a:off x="7913815" y="145338"/>
+            <a:ext cx="912497" cy="912497"/>
+          </a:xfrm>
+          <a:prstGeom prst="rect">
+            <a:avLst/>
+          </a:prstGeom>
+        </p:spPr>
+      </p:pic>
     </p:spTree>
     <p:extLst>
       <p:ext uri="{BB962C8B-B14F-4D97-AF65-F5344CB8AC3E}">
@@ -6811,8 +7159,84 @@
                 <a:latin typeface="Roboto" panose="02000000000000000000" pitchFamily="2" charset="0"/>
                 <a:ea typeface="Roboto" panose="02000000000000000000" pitchFamily="2" charset="0"/>
                 <a:cs typeface="Roboto" panose="02000000000000000000" pitchFamily="2" charset="0"/>
+                <a:hlinkClick r:id="rId3"/>
               </a:rPr>
               <a:t>white paper</a:t>
+            </a:r>
+            <a:endParaRPr lang="en-US" dirty="0">
+              <a:latin typeface="Roboto" panose="02000000000000000000" pitchFamily="2" charset="0"/>
+              <a:ea typeface="Roboto" panose="02000000000000000000" pitchFamily="2" charset="0"/>
+              <a:cs typeface="Roboto" panose="02000000000000000000" pitchFamily="2" charset="0"/>
+            </a:endParaRPr>
+          </a:p>
+          <a:p>
+            <a:pPr lvl="1"/>
+            <a:r>
+              <a:rPr lang="en-US" dirty="0">
+                <a:latin typeface="Roboto" panose="02000000000000000000" pitchFamily="2" charset="0"/>
+                <a:ea typeface="Roboto" panose="02000000000000000000" pitchFamily="2" charset="0"/>
+                <a:cs typeface="Roboto" panose="02000000000000000000" pitchFamily="2" charset="0"/>
+              </a:rPr>
+              <a:t>Adding flight framework comparison (F’ / </a:t>
+            </a:r>
+            <a:r>
+              <a:rPr lang="en-US" dirty="0" err="1">
+                <a:latin typeface="Roboto" panose="02000000000000000000" pitchFamily="2" charset="0"/>
+                <a:ea typeface="Roboto" panose="02000000000000000000" pitchFamily="2" charset="0"/>
+                <a:cs typeface="Roboto" panose="02000000000000000000" pitchFamily="2" charset="0"/>
+              </a:rPr>
+              <a:t>cFS</a:t>
+            </a:r>
+            <a:r>
+              <a:rPr lang="en-US" dirty="0">
+                <a:latin typeface="Roboto" panose="02000000000000000000" pitchFamily="2" charset="0"/>
+                <a:ea typeface="Roboto" panose="02000000000000000000" pitchFamily="2" charset="0"/>
+                <a:cs typeface="Roboto" panose="02000000000000000000" pitchFamily="2" charset="0"/>
+              </a:rPr>
+              <a:t> / GERICOS / CAST / </a:t>
+            </a:r>
+            <a:r>
+              <a:rPr lang="en-US" dirty="0" err="1">
+                <a:latin typeface="Roboto" panose="02000000000000000000" pitchFamily="2" charset="0"/>
+                <a:ea typeface="Roboto" panose="02000000000000000000" pitchFamily="2" charset="0"/>
+                <a:cs typeface="Roboto" panose="02000000000000000000" pitchFamily="2" charset="0"/>
+              </a:rPr>
+              <a:t>KubOS</a:t>
+            </a:r>
+            <a:r>
+              <a:rPr lang="en-US" dirty="0">
+                <a:latin typeface="Roboto" panose="02000000000000000000" pitchFamily="2" charset="0"/>
+                <a:ea typeface="Roboto" panose="02000000000000000000" pitchFamily="2" charset="0"/>
+                <a:cs typeface="Roboto" panose="02000000000000000000" pitchFamily="2" charset="0"/>
+              </a:rPr>
+              <a:t> / …)</a:t>
+            </a:r>
+          </a:p>
+          <a:p>
+            <a:pPr lvl="1"/>
+            <a:r>
+              <a:rPr lang="en-US" dirty="0">
+                <a:latin typeface="Roboto" panose="02000000000000000000" pitchFamily="2" charset="0"/>
+                <a:ea typeface="Roboto" panose="02000000000000000000" pitchFamily="2" charset="0"/>
+                <a:cs typeface="Roboto" panose="02000000000000000000" pitchFamily="2" charset="0"/>
+              </a:rPr>
+              <a:t>Survey on satellite use of Linux (SAT GUS / </a:t>
+            </a:r>
+            <a:r>
+              <a:rPr lang="en-US" dirty="0" err="1">
+                <a:latin typeface="Roboto" panose="02000000000000000000" pitchFamily="2" charset="0"/>
+                <a:ea typeface="Roboto" panose="02000000000000000000" pitchFamily="2" charset="0"/>
+                <a:cs typeface="Roboto" panose="02000000000000000000" pitchFamily="2" charset="0"/>
+              </a:rPr>
+              <a:t>SuperDoves</a:t>
+            </a:r>
+            <a:r>
+              <a:rPr lang="en-US" dirty="0">
+                <a:latin typeface="Roboto" panose="02000000000000000000" pitchFamily="2" charset="0"/>
+                <a:ea typeface="Roboto" panose="02000000000000000000" pitchFamily="2" charset="0"/>
+                <a:cs typeface="Roboto" panose="02000000000000000000" pitchFamily="2" charset="0"/>
+              </a:rPr>
+              <a:t> / …)</a:t>
             </a:r>
           </a:p>
           <a:p>
@@ -6831,7 +7255,24 @@
                 <a:ea typeface="Roboto" panose="02000000000000000000" pitchFamily="2" charset="0"/>
                 <a:cs typeface="Roboto" panose="02000000000000000000" pitchFamily="2" charset="0"/>
               </a:rPr>
-              <a:t>Publish a “Cabin Lighting” use-cases with a practical verification example</a:t>
+              <a:t>Publish a “Cabin Lighting” use-cases with a practical </a:t>
+            </a:r>
+            <a:r>
+              <a:rPr lang="en-US" dirty="0">
+                <a:latin typeface="Roboto" panose="02000000000000000000" pitchFamily="2" charset="0"/>
+                <a:ea typeface="Roboto" panose="02000000000000000000" pitchFamily="2" charset="0"/>
+                <a:cs typeface="Roboto" panose="02000000000000000000" pitchFamily="2" charset="0"/>
+                <a:hlinkClick r:id="rId4"/>
+              </a:rPr>
+              <a:t>verification</a:t>
+            </a:r>
+            <a:r>
+              <a:rPr lang="en-US" dirty="0">
+                <a:latin typeface="Roboto" panose="02000000000000000000" pitchFamily="2" charset="0"/>
+                <a:ea typeface="Roboto" panose="02000000000000000000" pitchFamily="2" charset="0"/>
+                <a:cs typeface="Roboto" panose="02000000000000000000" pitchFamily="2" charset="0"/>
+              </a:rPr>
+              <a:t> example</a:t>
             </a:r>
           </a:p>
           <a:p>
@@ -6846,42 +7287,11 @@
             <a:pPr algn="l"/>
             <a:r>
               <a:rPr lang="en-US" dirty="0">
-                <a:highlight>
-                  <a:srgbClr val="FFFF00"/>
-                </a:highlight>
                 <a:latin typeface="Roboto" panose="02000000000000000000" pitchFamily="2" charset="0"/>
                 <a:ea typeface="Roboto" panose="02000000000000000000" pitchFamily="2" charset="0"/>
                 <a:cs typeface="Roboto" panose="02000000000000000000" pitchFamily="2" charset="0"/>
               </a:rPr>
-              <a:t>Ideas?????</a:t>
-            </a:r>
-          </a:p>
-          <a:p>
-            <a:pPr lvl="1"/>
-            <a:r>
-              <a:rPr lang="en-US" dirty="0">
-                <a:highlight>
-                  <a:srgbClr val="FFFF00"/>
-                </a:highlight>
-                <a:latin typeface="Roboto" panose="02000000000000000000" pitchFamily="2" charset="0"/>
-                <a:ea typeface="Roboto" panose="02000000000000000000" pitchFamily="2" charset="0"/>
-                <a:cs typeface="Roboto" panose="02000000000000000000" pitchFamily="2" charset="0"/>
-              </a:rPr>
-              <a:t>Start a use case on a more critical system???</a:t>
-            </a:r>
-          </a:p>
-          <a:p>
-            <a:pPr lvl="1"/>
-            <a:r>
-              <a:rPr lang="en-US" dirty="0">
-                <a:highlight>
-                  <a:srgbClr val="FFFF00"/>
-                </a:highlight>
-                <a:latin typeface="Roboto" panose="02000000000000000000" pitchFamily="2" charset="0"/>
-                <a:ea typeface="Roboto" panose="02000000000000000000" pitchFamily="2" charset="0"/>
-                <a:cs typeface="Roboto" panose="02000000000000000000" pitchFamily="2" charset="0"/>
-              </a:rPr>
-              <a:t>Make a safety standards decoder to help people understand applicability across a class/rigor/level regulated space.  i.e. give people example products to help visualize applicability.  E.g., a coffeemaker vs landing lights</a:t>
+              <a:t>Support standardization of Linux Kernel Requirements and Test trace</a:t>
             </a:r>
           </a:p>
         </p:txBody>
@@ -7145,6 +7555,36 @@
           </a:p>
         </p:txBody>
       </p:sp>
+      <p:pic>
+        <p:nvPicPr>
+          <p:cNvPr id="2" name="Picture 1">
+            <a:extLst>
+              <a:ext uri="{FF2B5EF4-FFF2-40B4-BE49-F238E27FC236}">
+                <a16:creationId xmlns:a16="http://schemas.microsoft.com/office/drawing/2014/main" id="{59FD92E5-506A-ECA0-DCD3-EE8E88D52C83}"/>
+              </a:ext>
+            </a:extLst>
+          </p:cNvPr>
+          <p:cNvPicPr>
+            <a:picLocks noChangeAspect="1"/>
+          </p:cNvPicPr>
+          <p:nvPr/>
+        </p:nvPicPr>
+        <p:blipFill>
+          <a:blip r:embed="rId5"/>
+          <a:stretch>
+            <a:fillRect/>
+          </a:stretch>
+        </p:blipFill>
+        <p:spPr>
+          <a:xfrm>
+            <a:off x="7913815" y="145338"/>
+            <a:ext cx="912497" cy="912497"/>
+          </a:xfrm>
+          <a:prstGeom prst="rect">
+            <a:avLst/>
+          </a:prstGeom>
+        </p:spPr>
+      </p:pic>
     </p:spTree>
     <p:extLst>
       <p:ext uri="{BB962C8B-B14F-4D97-AF65-F5344CB8AC3E}">
@@ -8280,15 +8720,6 @@
 </file>
 
 <file path=customXml/item2.xml><?xml version="1.0" encoding="utf-8"?>
-<?mso-contentType ?>
-<FormTemplates xmlns="http://schemas.microsoft.com/sharepoint/v3/contenttype/forms">
-  <Display>DocumentLibraryForm</Display>
-  <Edit>DocumentLibraryForm</Edit>
-  <New>DocumentLibraryForm</New>
-</FormTemplates>
-</file>
-
-<file path=customXml/item3.xml><?xml version="1.0" encoding="utf-8"?>
 <ct:contentTypeSchema xmlns:ct="http://schemas.microsoft.com/office/2006/metadata/contentType" xmlns:ma="http://schemas.microsoft.com/office/2006/metadata/properties/metaAttributes" ct:_="" ma:_="" ma:contentTypeName="Document" ma:contentTypeID="0x01010083BC8A387F61784BA7FCD14D3BD9BA97" ma:contentTypeVersion="9" ma:contentTypeDescription="Create a new document." ma:contentTypeScope="" ma:versionID="ab9bd752c275b64874dc0833a8669543">
   <xsd:schema xmlns:xsd="http://www.w3.org/2001/XMLSchema" xmlns:xs="http://www.w3.org/2001/XMLSchema" xmlns:p="http://schemas.microsoft.com/office/2006/metadata/properties" xmlns:ns3="2c13b40f-93e8-44d0-9439-bff2a3aff2ef" xmlns:ns4="1dedc83c-9b83-4e9e-a3ee-ea7e82b4a201" targetNamespace="http://schemas.microsoft.com/office/2006/metadata/properties" ma:root="true" ma:fieldsID="7884d37d3f3583bf67357d5b8e952c02" ns3:_="" ns4:_="">
     <xsd:import namespace="2c13b40f-93e8-44d0-9439-bff2a3aff2ef"/>
@@ -8483,6 +8914,15 @@
 </ct:contentTypeSchema>
 </file>
 
+<file path=customXml/item3.xml><?xml version="1.0" encoding="utf-8"?>
+<?mso-contentType ?>
+<FormTemplates xmlns="http://schemas.microsoft.com/sharepoint/v3/contenttype/forms">
+  <Display>DocumentLibraryForm</Display>
+  <Edit>DocumentLibraryForm</Edit>
+  <New>DocumentLibraryForm</New>
+</FormTemplates>
+</file>
+
 <file path=customXml/itemProps1.xml><?xml version="1.0" encoding="utf-8"?>
 <ds:datastoreItem xmlns:ds="http://schemas.openxmlformats.org/officeDocument/2006/customXml" ds:itemID="{2E62BA38-5CD8-4CF6-B14C-B5E0E849EECA}">
   <ds:schemaRefs>
@@ -8501,14 +8941,6 @@
 </file>
 
 <file path=customXml/itemProps2.xml><?xml version="1.0" encoding="utf-8"?>
-<ds:datastoreItem xmlns:ds="http://schemas.openxmlformats.org/officeDocument/2006/customXml" ds:itemID="{24B6D469-2EE5-4294-AD1E-F96757AC7F57}">
-  <ds:schemaRefs>
-    <ds:schemaRef ds:uri="http://schemas.microsoft.com/sharepoint/v3/contenttype/forms"/>
-  </ds:schemaRefs>
-</ds:datastoreItem>
-</file>
-
-<file path=customXml/itemProps3.xml><?xml version="1.0" encoding="utf-8"?>
 <ds:datastoreItem xmlns:ds="http://schemas.openxmlformats.org/officeDocument/2006/customXml" ds:itemID="{7C1E51B2-0B7C-40F5-9B89-16CA851D5762}">
   <ds:schemaRefs>
     <ds:schemaRef ds:uri="http://schemas.microsoft.com/office/2006/metadata/contentType"/>
@@ -8525,4 +8957,12 @@
     <ds:schemaRef ds:uri="http://schemas.microsoft.com/internal/obd"/>
   </ds:schemaRefs>
 </ds:datastoreItem>
+</file>
+
+<file path=customXml/itemProps3.xml><?xml version="1.0" encoding="utf-8"?>
+<ds:datastoreItem xmlns:ds="http://schemas.openxmlformats.org/officeDocument/2006/customXml" ds:itemID="{24B6D469-2EE5-4294-AD1E-F96757AC7F57}">
+  <ds:schemaRefs>
+    <ds:schemaRef ds:uri="http://schemas.microsoft.com/sharepoint/v3/contenttype/forms"/>
+  </ds:schemaRefs>
+</ds:datastoreItem>
 </file>
</xml_diff>

<commit_message>
Correct 2025 Annual Update QRCode
Signed-off-by: Weber (US), Matthew L <matthew.l.weber3@boeing.com>
</commit_message>
<xml_diff>
--- a/presentations/ELISA-aerospace-wg-updates-2025.pptx
+++ b/presentations/ELISA-aerospace-wg-updates-2025.pptx
@@ -4560,10 +4560,10 @@
       </p:sp>
       <p:pic>
         <p:nvPicPr>
-          <p:cNvPr id="3" name="Picture 2">
+          <p:cNvPr id="4" name="Picture 3">
             <a:extLst>
               <a:ext uri="{FF2B5EF4-FFF2-40B4-BE49-F238E27FC236}">
-                <a16:creationId xmlns:a16="http://schemas.microsoft.com/office/drawing/2014/main" id="{82788077-864B-AC07-3BE4-7F00FA906745}"/>
+                <a16:creationId xmlns:a16="http://schemas.microsoft.com/office/drawing/2014/main" id="{51B42C24-B636-F2EB-82D0-A74E7A00A61C}"/>
               </a:ext>
             </a:extLst>
           </p:cNvPr>
@@ -4580,8 +4580,8 @@
         </p:blipFill>
         <p:spPr>
           <a:xfrm>
-            <a:off x="7913815" y="145338"/>
-            <a:ext cx="912497" cy="912497"/>
+            <a:off x="7880325" y="300878"/>
+            <a:ext cx="854100" cy="854100"/>
           </a:xfrm>
           <a:prstGeom prst="rect">
             <a:avLst/>
@@ -5042,10 +5042,10 @@
       </p:sp>
       <p:pic>
         <p:nvPicPr>
-          <p:cNvPr id="2" name="Picture 1">
+          <p:cNvPr id="4" name="Picture 3">
             <a:extLst>
               <a:ext uri="{FF2B5EF4-FFF2-40B4-BE49-F238E27FC236}">
-                <a16:creationId xmlns:a16="http://schemas.microsoft.com/office/drawing/2014/main" id="{D7480085-EDC4-C29B-F4C1-558C35C2FE2C}"/>
+                <a16:creationId xmlns:a16="http://schemas.microsoft.com/office/drawing/2014/main" id="{1E8C1847-D4A8-36E7-980E-8ADC78E0793F}"/>
               </a:ext>
             </a:extLst>
           </p:cNvPr>
@@ -5062,8 +5062,8 @@
         </p:blipFill>
         <p:spPr>
           <a:xfrm>
-            <a:off x="7913815" y="145338"/>
-            <a:ext cx="912497" cy="912497"/>
+            <a:off x="7880325" y="300878"/>
+            <a:ext cx="854100" cy="854100"/>
           </a:xfrm>
           <a:prstGeom prst="rect">
             <a:avLst/>
@@ -5781,10 +5781,10 @@
       </p:sp>
       <p:pic>
         <p:nvPicPr>
-          <p:cNvPr id="2" name="Picture 1">
+          <p:cNvPr id="3" name="Picture 2">
             <a:extLst>
               <a:ext uri="{FF2B5EF4-FFF2-40B4-BE49-F238E27FC236}">
-                <a16:creationId xmlns:a16="http://schemas.microsoft.com/office/drawing/2014/main" id="{B87FF560-04A4-215C-CB0C-690CEC6D5F2B}"/>
+                <a16:creationId xmlns:a16="http://schemas.microsoft.com/office/drawing/2014/main" id="{E254B060-7EFD-D616-AB99-2CB9181A8DC0}"/>
               </a:ext>
             </a:extLst>
           </p:cNvPr>
@@ -5801,8 +5801,8 @@
         </p:blipFill>
         <p:spPr>
           <a:xfrm>
-            <a:off x="7913815" y="145338"/>
-            <a:ext cx="912497" cy="912497"/>
+            <a:off x="7880325" y="300878"/>
+            <a:ext cx="854100" cy="854100"/>
           </a:xfrm>
           <a:prstGeom prst="rect">
             <a:avLst/>
@@ -6434,10 +6434,10 @@
       </p:sp>
       <p:pic>
         <p:nvPicPr>
-          <p:cNvPr id="2" name="Picture 1">
+          <p:cNvPr id="3" name="Picture 2">
             <a:extLst>
               <a:ext uri="{FF2B5EF4-FFF2-40B4-BE49-F238E27FC236}">
-                <a16:creationId xmlns:a16="http://schemas.microsoft.com/office/drawing/2014/main" id="{53F04357-860B-0818-6C75-F0B709F1D8C7}"/>
+                <a16:creationId xmlns:a16="http://schemas.microsoft.com/office/drawing/2014/main" id="{27AF3530-5570-D729-F4B0-B8646049BC5F}"/>
               </a:ext>
             </a:extLst>
           </p:cNvPr>
@@ -6454,8 +6454,8 @@
         </p:blipFill>
         <p:spPr>
           <a:xfrm>
-            <a:off x="7913815" y="145338"/>
-            <a:ext cx="912497" cy="912497"/>
+            <a:off x="7880325" y="300878"/>
+            <a:ext cx="854100" cy="854100"/>
           </a:xfrm>
           <a:prstGeom prst="rect">
             <a:avLst/>
@@ -6991,10 +6991,10 @@
       </p:sp>
       <p:pic>
         <p:nvPicPr>
-          <p:cNvPr id="2" name="Picture 1">
+          <p:cNvPr id="3" name="Picture 2">
             <a:extLst>
               <a:ext uri="{FF2B5EF4-FFF2-40B4-BE49-F238E27FC236}">
-                <a16:creationId xmlns:a16="http://schemas.microsoft.com/office/drawing/2014/main" id="{2487FE27-03EB-F49D-6BA4-C16F398F57F5}"/>
+                <a16:creationId xmlns:a16="http://schemas.microsoft.com/office/drawing/2014/main" id="{F7DF111A-58D5-7FEF-5368-C442E7B21921}"/>
               </a:ext>
             </a:extLst>
           </p:cNvPr>
@@ -7011,8 +7011,8 @@
         </p:blipFill>
         <p:spPr>
           <a:xfrm>
-            <a:off x="7913815" y="145338"/>
-            <a:ext cx="912497" cy="912497"/>
+            <a:off x="7880325" y="300878"/>
+            <a:ext cx="854100" cy="854100"/>
           </a:xfrm>
           <a:prstGeom prst="rect">
             <a:avLst/>
@@ -7557,10 +7557,10 @@
       </p:sp>
       <p:pic>
         <p:nvPicPr>
-          <p:cNvPr id="2" name="Picture 1">
+          <p:cNvPr id="3" name="Picture 2">
             <a:extLst>
               <a:ext uri="{FF2B5EF4-FFF2-40B4-BE49-F238E27FC236}">
-                <a16:creationId xmlns:a16="http://schemas.microsoft.com/office/drawing/2014/main" id="{59FD92E5-506A-ECA0-DCD3-EE8E88D52C83}"/>
+                <a16:creationId xmlns:a16="http://schemas.microsoft.com/office/drawing/2014/main" id="{621905D9-35D1-870C-1A73-A4B885EEBF94}"/>
               </a:ext>
             </a:extLst>
           </p:cNvPr>
@@ -7577,8 +7577,8 @@
         </p:blipFill>
         <p:spPr>
           <a:xfrm>
-            <a:off x="7913815" y="145338"/>
-            <a:ext cx="912497" cy="912497"/>
+            <a:off x="7880325" y="300878"/>
+            <a:ext cx="854100" cy="854100"/>
           </a:xfrm>
           <a:prstGeom prst="rect">
             <a:avLst/>
@@ -8720,6 +8720,15 @@
 </file>
 
 <file path=customXml/item2.xml><?xml version="1.0" encoding="utf-8"?>
+<?mso-contentType ?>
+<FormTemplates xmlns="http://schemas.microsoft.com/sharepoint/v3/contenttype/forms">
+  <Display>DocumentLibraryForm</Display>
+  <Edit>DocumentLibraryForm</Edit>
+  <New>DocumentLibraryForm</New>
+</FormTemplates>
+</file>
+
+<file path=customXml/item3.xml><?xml version="1.0" encoding="utf-8"?>
 <ct:contentTypeSchema xmlns:ct="http://schemas.microsoft.com/office/2006/metadata/contentType" xmlns:ma="http://schemas.microsoft.com/office/2006/metadata/properties/metaAttributes" ct:_="" ma:_="" ma:contentTypeName="Document" ma:contentTypeID="0x01010083BC8A387F61784BA7FCD14D3BD9BA97" ma:contentTypeVersion="9" ma:contentTypeDescription="Create a new document." ma:contentTypeScope="" ma:versionID="ab9bd752c275b64874dc0833a8669543">
   <xsd:schema xmlns:xsd="http://www.w3.org/2001/XMLSchema" xmlns:xs="http://www.w3.org/2001/XMLSchema" xmlns:p="http://schemas.microsoft.com/office/2006/metadata/properties" xmlns:ns3="2c13b40f-93e8-44d0-9439-bff2a3aff2ef" xmlns:ns4="1dedc83c-9b83-4e9e-a3ee-ea7e82b4a201" targetNamespace="http://schemas.microsoft.com/office/2006/metadata/properties" ma:root="true" ma:fieldsID="7884d37d3f3583bf67357d5b8e952c02" ns3:_="" ns4:_="">
     <xsd:import namespace="2c13b40f-93e8-44d0-9439-bff2a3aff2ef"/>
@@ -8914,15 +8923,6 @@
 </ct:contentTypeSchema>
 </file>
 
-<file path=customXml/item3.xml><?xml version="1.0" encoding="utf-8"?>
-<?mso-contentType ?>
-<FormTemplates xmlns="http://schemas.microsoft.com/sharepoint/v3/contenttype/forms">
-  <Display>DocumentLibraryForm</Display>
-  <Edit>DocumentLibraryForm</Edit>
-  <New>DocumentLibraryForm</New>
-</FormTemplates>
-</file>
-
 <file path=customXml/itemProps1.xml><?xml version="1.0" encoding="utf-8"?>
 <ds:datastoreItem xmlns:ds="http://schemas.openxmlformats.org/officeDocument/2006/customXml" ds:itemID="{2E62BA38-5CD8-4CF6-B14C-B5E0E849EECA}">
   <ds:schemaRefs>
@@ -8941,6 +8941,14 @@
 </file>
 
 <file path=customXml/itemProps2.xml><?xml version="1.0" encoding="utf-8"?>
+<ds:datastoreItem xmlns:ds="http://schemas.openxmlformats.org/officeDocument/2006/customXml" ds:itemID="{24B6D469-2EE5-4294-AD1E-F96757AC7F57}">
+  <ds:schemaRefs>
+    <ds:schemaRef ds:uri="http://schemas.microsoft.com/sharepoint/v3/contenttype/forms"/>
+  </ds:schemaRefs>
+</ds:datastoreItem>
+</file>
+
+<file path=customXml/itemProps3.xml><?xml version="1.0" encoding="utf-8"?>
 <ds:datastoreItem xmlns:ds="http://schemas.openxmlformats.org/officeDocument/2006/customXml" ds:itemID="{7C1E51B2-0B7C-40F5-9B89-16CA851D5762}">
   <ds:schemaRefs>
     <ds:schemaRef ds:uri="http://schemas.microsoft.com/office/2006/metadata/contentType"/>
@@ -8957,12 +8965,4 @@
     <ds:schemaRef ds:uri="http://schemas.microsoft.com/internal/obd"/>
   </ds:schemaRefs>
 </ds:datastoreItem>
-</file>
-
-<file path=customXml/itemProps3.xml><?xml version="1.0" encoding="utf-8"?>
-<ds:datastoreItem xmlns:ds="http://schemas.openxmlformats.org/officeDocument/2006/customXml" ds:itemID="{24B6D469-2EE5-4294-AD1E-F96757AC7F57}">
-  <ds:schemaRefs>
-    <ds:schemaRef ds:uri="http://schemas.microsoft.com/sharepoint/v3/contenttype/forms"/>
-  </ds:schemaRefs>
-</ds:datastoreItem>
 </file>
</xml_diff>

<commit_message>
Annual Update: add pictures and breakdown 2025 into a couple slides
Signed-off-by: Weber (US), Matthew L <matthew.l.weber3@boeing.com>
</commit_message>
<xml_diff>
--- a/presentations/ELISA-aerospace-wg-updates-2025.pptx
+++ b/presentations/ELISA-aerospace-wg-updates-2025.pptx
@@ -5,7 +5,7 @@
     <p:sldMasterId id="2147483654" r:id="rId4"/>
   </p:sldMasterIdLst>
   <p:notesMasterIdLst>
-    <p:notesMasterId r:id="rId12"/>
+    <p:notesMasterId r:id="rId13"/>
   </p:notesMasterIdLst>
   <p:sldIdLst>
     <p:sldId id="256" r:id="rId5"/>
@@ -14,29 +14,30 @@
     <p:sldId id="266" r:id="rId8"/>
     <p:sldId id="263" r:id="rId9"/>
     <p:sldId id="267" r:id="rId10"/>
-    <p:sldId id="262" r:id="rId11"/>
+    <p:sldId id="268" r:id="rId11"/>
+    <p:sldId id="262" r:id="rId12"/>
   </p:sldIdLst>
   <p:sldSz cx="9144000" cy="5143500" type="screen16x9"/>
   <p:notesSz cx="6858000" cy="9144000"/>
   <p:embeddedFontLst>
     <p:embeddedFont>
       <p:font typeface="Arial Narrow" panose="020B0606020202030204" pitchFamily="34" charset="0"/>
-      <p:regular r:id="rId13"/>
-      <p:bold r:id="rId14"/>
-      <p:italic r:id="rId15"/>
-      <p:boldItalic r:id="rId16"/>
+      <p:regular r:id="rId14"/>
+      <p:bold r:id="rId15"/>
+      <p:italic r:id="rId16"/>
+      <p:boldItalic r:id="rId17"/>
     </p:embeddedFont>
     <p:embeddedFont>
       <p:font typeface="Dosis" pitchFamily="2" charset="0"/>
-      <p:regular r:id="rId17"/>
-      <p:bold r:id="rId18"/>
+      <p:regular r:id="rId18"/>
+      <p:bold r:id="rId19"/>
     </p:embeddedFont>
     <p:embeddedFont>
       <p:font typeface="Roboto" panose="02000000000000000000" pitchFamily="2" charset="0"/>
-      <p:regular r:id="rId19"/>
-      <p:bold r:id="rId20"/>
-      <p:italic r:id="rId21"/>
-      <p:boldItalic r:id="rId22"/>
+      <p:regular r:id="rId20"/>
+      <p:bold r:id="rId21"/>
+      <p:italic r:id="rId22"/>
+      <p:boldItalic r:id="rId23"/>
     </p:embeddedFont>
   </p:embeddedFontLst>
   <p:defaultTextStyle>
@@ -855,7 +856,7 @@
                 <a:ea typeface="Times New Roman" panose="02020603050405020304" pitchFamily="18" charset="0"/>
                 <a:cs typeface="Times New Roman" panose="02020603050405020304" pitchFamily="18" charset="0"/>
               </a:rPr>
-              <a:t>Thank Steve</a:t>
+              <a:t>Thank Steve and a quick Bio</a:t>
             </a:r>
           </a:p>
           <a:p>
@@ -1493,6 +1494,133 @@
 </file>
 
 <file path=ppt/notesSlides/notesSlide7.xml><?xml version="1.0" encoding="utf-8"?>
+<p:notes xmlns:a="http://schemas.openxmlformats.org/drawingml/2006/main" xmlns:r="http://schemas.openxmlformats.org/officeDocument/2006/relationships" xmlns:p="http://schemas.openxmlformats.org/presentationml/2006/main" showMasterSp="0" showMasterPhAnim="0">
+  <p:cSld>
+    <p:spTree>
+      <p:nvGrpSpPr>
+        <p:cNvPr id="1" name="Shape 51">
+          <a:extLst>
+            <a:ext uri="{FF2B5EF4-FFF2-40B4-BE49-F238E27FC236}">
+              <a16:creationId xmlns:a16="http://schemas.microsoft.com/office/drawing/2014/main" id="{D89F90D1-650C-0C44-25CB-6CC142B358FB}"/>
+            </a:ext>
+          </a:extLst>
+        </p:cNvPr>
+        <p:cNvGrpSpPr/>
+        <p:nvPr/>
+      </p:nvGrpSpPr>
+      <p:grpSpPr>
+        <a:xfrm>
+          <a:off x="0" y="0"/>
+          <a:ext cx="0" cy="0"/>
+          <a:chOff x="0" y="0"/>
+          <a:chExt cx="0" cy="0"/>
+        </a:xfrm>
+      </p:grpSpPr>
+      <p:sp>
+        <p:nvSpPr>
+          <p:cNvPr id="52" name="Google Shape;52;g5f61e1cf29_0_31:notes">
+            <a:extLst>
+              <a:ext uri="{FF2B5EF4-FFF2-40B4-BE49-F238E27FC236}">
+                <a16:creationId xmlns:a16="http://schemas.microsoft.com/office/drawing/2014/main" id="{43726A5C-CFEE-843D-3830-CCCDB94F2D41}"/>
+              </a:ext>
+            </a:extLst>
+          </p:cNvPr>
+          <p:cNvSpPr>
+            <a:spLocks noGrp="1" noRot="1" noChangeAspect="1"/>
+          </p:cNvSpPr>
+          <p:nvPr>
+            <p:ph type="sldImg" idx="2"/>
+          </p:nvPr>
+        </p:nvSpPr>
+        <p:spPr>
+          <a:xfrm>
+            <a:off x="381000" y="685800"/>
+            <a:ext cx="6096000" cy="3429000"/>
+          </a:xfrm>
+          <a:custGeom>
+            <a:avLst/>
+            <a:gdLst/>
+            <a:ahLst/>
+            <a:cxnLst/>
+            <a:rect l="l" t="t" r="r" b="b"/>
+            <a:pathLst>
+              <a:path w="120000" h="120000" extrusionOk="0">
+                <a:moveTo>
+                  <a:pt x="0" y="0"/>
+                </a:moveTo>
+                <a:lnTo>
+                  <a:pt x="120000" y="0"/>
+                </a:lnTo>
+                <a:lnTo>
+                  <a:pt x="120000" y="120000"/>
+                </a:lnTo>
+                <a:lnTo>
+                  <a:pt x="0" y="120000"/>
+                </a:lnTo>
+                <a:close/>
+              </a:path>
+            </a:pathLst>
+          </a:custGeom>
+        </p:spPr>
+      </p:sp>
+      <p:sp>
+        <p:nvSpPr>
+          <p:cNvPr id="53" name="Google Shape;53;g5f61e1cf29_0_31:notes">
+            <a:extLst>
+              <a:ext uri="{FF2B5EF4-FFF2-40B4-BE49-F238E27FC236}">
+                <a16:creationId xmlns:a16="http://schemas.microsoft.com/office/drawing/2014/main" id="{8679592D-88E9-4F03-BF01-3E4E48982EF3}"/>
+              </a:ext>
+            </a:extLst>
+          </p:cNvPr>
+          <p:cNvSpPr txBox="1">
+            <a:spLocks noGrp="1"/>
+          </p:cNvSpPr>
+          <p:nvPr>
+            <p:ph type="body" idx="1"/>
+          </p:nvPr>
+        </p:nvSpPr>
+        <p:spPr>
+          <a:xfrm>
+            <a:off x="685800" y="4343400"/>
+            <a:ext cx="5486400" cy="4114800"/>
+          </a:xfrm>
+          <a:prstGeom prst="rect">
+            <a:avLst/>
+          </a:prstGeom>
+        </p:spPr>
+        <p:txBody>
+          <a:bodyPr spcFirstLastPara="1" wrap="square" lIns="91425" tIns="91425" rIns="91425" bIns="91425" anchor="t" anchorCtr="0">
+            <a:noAutofit/>
+          </a:bodyPr>
+          <a:lstStyle/>
+          <a:p>
+            <a:pPr marL="0" lvl="0" indent="0" algn="l" rtl="0">
+              <a:spcBef>
+                <a:spcPts val="0"/>
+              </a:spcBef>
+              <a:spcAft>
+                <a:spcPts val="0"/>
+              </a:spcAft>
+              <a:buNone/>
+            </a:pPr>
+            <a:endParaRPr/>
+          </a:p>
+        </p:txBody>
+      </p:sp>
+    </p:spTree>
+    <p:extLst>
+      <p:ext uri="{BB962C8B-B14F-4D97-AF65-F5344CB8AC3E}">
+        <p14:creationId xmlns:p14="http://schemas.microsoft.com/office/powerpoint/2010/main" val="1647919632"/>
+      </p:ext>
+    </p:extLst>
+  </p:cSld>
+  <p:clrMapOvr>
+    <a:masterClrMapping/>
+  </p:clrMapOvr>
+</p:notes>
+</file>
+
+<file path=ppt/notesSlides/notesSlide8.xml><?xml version="1.0" encoding="utf-8"?>
 <p:notes xmlns:a="http://schemas.openxmlformats.org/drawingml/2006/main" xmlns:r="http://schemas.openxmlformats.org/officeDocument/2006/relationships" xmlns:p="http://schemas.openxmlformats.org/presentationml/2006/main" showMasterSp="0" showMasterPhAnim="0">
   <p:cSld>
     <p:spTree>
@@ -5381,7 +5509,23 @@
                 <a:ea typeface="Roboto" panose="02000000000000000000" pitchFamily="2" charset="0"/>
                 <a:cs typeface="Roboto" panose="02000000000000000000" pitchFamily="2" charset="0"/>
               </a:rPr>
-              <a:t>Drafted </a:t>
+              <a:t>Use case: </a:t>
+            </a:r>
+            <a:r>
+              <a:rPr lang="en-US" b="1" dirty="0">
+                <a:latin typeface="Roboto" panose="02000000000000000000" pitchFamily="2" charset="0"/>
+                <a:ea typeface="Roboto" panose="02000000000000000000" pitchFamily="2" charset="0"/>
+                <a:cs typeface="Roboto" panose="02000000000000000000" pitchFamily="2" charset="0"/>
+              </a:rPr>
+              <a:t>“Cabin Lighting”</a:t>
+            </a:r>
+            <a:r>
+              <a:rPr lang="en-US" dirty="0">
+                <a:latin typeface="Roboto" panose="02000000000000000000" pitchFamily="2" charset="0"/>
+                <a:ea typeface="Roboto" panose="02000000000000000000" pitchFamily="2" charset="0"/>
+                <a:cs typeface="Roboto" panose="02000000000000000000" pitchFamily="2" charset="0"/>
+              </a:rPr>
+              <a:t> draft </a:t>
             </a:r>
             <a:r>
               <a:rPr lang="en-US" dirty="0">
@@ -5409,30 +5553,11 @@
               </a:rPr>
               <a:t>test</a:t>
             </a:r>
-            <a:r>
-              <a:rPr lang="en-US" dirty="0">
-                <a:latin typeface="Roboto" panose="02000000000000000000" pitchFamily="2" charset="0"/>
-                <a:ea typeface="Roboto" panose="02000000000000000000" pitchFamily="2" charset="0"/>
-                <a:cs typeface="Roboto" panose="02000000000000000000" pitchFamily="2" charset="0"/>
-              </a:rPr>
-              <a:t> for the </a:t>
-            </a:r>
-            <a:r>
-              <a:rPr lang="en-US" b="1" dirty="0">
-                <a:latin typeface="Roboto" panose="02000000000000000000" pitchFamily="2" charset="0"/>
-                <a:ea typeface="Roboto" panose="02000000000000000000" pitchFamily="2" charset="0"/>
-                <a:cs typeface="Roboto" panose="02000000000000000000" pitchFamily="2" charset="0"/>
-              </a:rPr>
-              <a:t>“Cabin Lighting”</a:t>
-            </a:r>
-            <a:r>
-              <a:rPr lang="en-US" dirty="0">
-                <a:latin typeface="Roboto" panose="02000000000000000000" pitchFamily="2" charset="0"/>
-                <a:ea typeface="Roboto" panose="02000000000000000000" pitchFamily="2" charset="0"/>
-                <a:cs typeface="Roboto" panose="02000000000000000000" pitchFamily="2" charset="0"/>
-              </a:rPr>
-              <a:t> use case</a:t>
-            </a:r>
+            <a:endParaRPr lang="en-US" dirty="0">
+              <a:latin typeface="Roboto" panose="02000000000000000000" pitchFamily="2" charset="0"/>
+              <a:ea typeface="Roboto" panose="02000000000000000000" pitchFamily="2" charset="0"/>
+              <a:cs typeface="Roboto" panose="02000000000000000000" pitchFamily="2" charset="0"/>
+            </a:endParaRPr>
           </a:p>
           <a:p>
             <a:pPr marL="285750" indent="-285750">
@@ -5803,6 +5928,36 @@
           <a:xfrm>
             <a:off x="7880325" y="300878"/>
             <a:ext cx="854100" cy="854100"/>
+          </a:xfrm>
+          <a:prstGeom prst="rect">
+            <a:avLst/>
+          </a:prstGeom>
+        </p:spPr>
+      </p:pic>
+      <p:pic>
+        <p:nvPicPr>
+          <p:cNvPr id="4" name="Picture 3">
+            <a:extLst>
+              <a:ext uri="{FF2B5EF4-FFF2-40B4-BE49-F238E27FC236}">
+                <a16:creationId xmlns:a16="http://schemas.microsoft.com/office/drawing/2014/main" id="{F06606E8-A2BB-3952-842B-2359791DA478}"/>
+              </a:ext>
+            </a:extLst>
+          </p:cNvPr>
+          <p:cNvPicPr>
+            <a:picLocks noChangeAspect="1"/>
+          </p:cNvPicPr>
+          <p:nvPr/>
+        </p:nvPicPr>
+        <p:blipFill>
+          <a:blip r:embed="rId7"/>
+          <a:stretch>
+            <a:fillRect/>
+          </a:stretch>
+        </p:blipFill>
+        <p:spPr>
+          <a:xfrm>
+            <a:off x="7628964" y="3306266"/>
+            <a:ext cx="944096" cy="1207730"/>
           </a:xfrm>
           <a:prstGeom prst="rect">
             <a:avLst/>
@@ -5912,7 +6067,7 @@
         <p:spPr>
           <a:xfrm>
             <a:off x="311700" y="1152475"/>
-            <a:ext cx="8520600" cy="3050100"/>
+            <a:ext cx="8688864" cy="3050100"/>
           </a:xfrm>
           <a:prstGeom prst="rect">
             <a:avLst/>
@@ -5992,37 +6147,8 @@
                   <a:srgbClr val="6A8A25"/>
                 </a:solidFill>
                 <a:effectLst/>
-                <a:latin typeface="Dosis" panose="020F0502020204030204" pitchFamily="2" charset="0"/>
+                <a:latin typeface="Dosis" pitchFamily="2" charset="0"/>
                 <a:hlinkClick r:id="rId4"/>
-              </a:rPr>
-              <a:t>Improving kernel design documentation and involving experts</a:t>
-            </a:r>
-            <a:endParaRPr lang="en-US" b="0" i="0" dirty="0">
-              <a:solidFill>
-                <a:srgbClr val="6A8A25"/>
-              </a:solidFill>
-              <a:effectLst/>
-              <a:latin typeface="Dosis" pitchFamily="2" charset="0"/>
-              <a:hlinkClick r:id="rId5"/>
-            </a:endParaRPr>
-          </a:p>
-          <a:p>
-            <a:pPr marL="1200150" lvl="2" indent="-285750">
-              <a:spcBef>
-                <a:spcPts val="100"/>
-              </a:spcBef>
-              <a:spcAft>
-                <a:spcPts val="100"/>
-              </a:spcAft>
-            </a:pPr>
-            <a:r>
-              <a:rPr lang="en-US" b="0" i="0" dirty="0">
-                <a:solidFill>
-                  <a:srgbClr val="6A8A25"/>
-                </a:solidFill>
-                <a:effectLst/>
-                <a:latin typeface="Dosis" pitchFamily="2" charset="0"/>
-                <a:hlinkClick r:id="rId5"/>
               </a:rPr>
               <a:t>Making Linux Fly: Towards a Certified Linux Kernel</a:t>
             </a:r>
@@ -6032,7 +6158,7 @@
               </a:solidFill>
               <a:effectLst/>
               <a:latin typeface="Dosis" panose="020F0502020204030204" pitchFamily="2" charset="0"/>
-              <a:hlinkClick r:id="rId4"/>
+              <a:hlinkClick r:id="rId5"/>
             </a:endParaRPr>
           </a:p>
           <a:p>
@@ -6065,6 +6191,15 @@
               </a:rPr>
               <a:t> </a:t>
             </a:r>
+            <a:br>
+              <a:rPr lang="en-US" b="0" i="0" dirty="0">
+                <a:solidFill>
+                  <a:srgbClr val="CB6D04"/>
+                </a:solidFill>
+                <a:effectLst/>
+                <a:latin typeface="Dosis" pitchFamily="2" charset="0"/>
+              </a:rPr>
+            </a:br>
             <a:r>
               <a:rPr lang="en-US" sz="1200" b="0" i="0" dirty="0">
                 <a:solidFill>
@@ -6098,16 +6233,33 @@
               <a:t>Linux Foundation EOSS - </a:t>
             </a:r>
             <a:r>
-              <a:rPr lang="en-US" dirty="0">
+              <a:rPr lang="en-US" sz="1200" dirty="0">
                 <a:latin typeface="Roboto" panose="02000000000000000000" pitchFamily="2" charset="0"/>
                 <a:ea typeface="Roboto" panose="02000000000000000000" pitchFamily="2" charset="0"/>
                 <a:cs typeface="Roboto" panose="02000000000000000000" pitchFamily="2" charset="0"/>
                 <a:hlinkClick r:id="rId7"/>
               </a:rPr>
-              <a:t>“Measuring Code Coverage of the Linux Kernel in Accordance with RTCA DO-178C Considerations,”</a:t>
-            </a:r>
-            <a:r>
-              <a:rPr lang="en-US" dirty="0">
+              <a:t>“Measuring Code Coverage of the </a:t>
+            </a:r>
+            <a:br>
+              <a:rPr lang="en-US" sz="1200" dirty="0">
+                <a:latin typeface="Roboto" panose="02000000000000000000" pitchFamily="2" charset="0"/>
+                <a:ea typeface="Roboto" panose="02000000000000000000" pitchFamily="2" charset="0"/>
+                <a:cs typeface="Roboto" panose="02000000000000000000" pitchFamily="2" charset="0"/>
+                <a:hlinkClick r:id="rId7"/>
+              </a:rPr>
+            </a:br>
+            <a:r>
+              <a:rPr lang="en-US" sz="1200" dirty="0">
+                <a:latin typeface="Roboto" panose="02000000000000000000" pitchFamily="2" charset="0"/>
+                <a:ea typeface="Roboto" panose="02000000000000000000" pitchFamily="2" charset="0"/>
+                <a:cs typeface="Roboto" panose="02000000000000000000" pitchFamily="2" charset="0"/>
+                <a:hlinkClick r:id="rId7"/>
+              </a:rPr>
+              <a:t>Linux Kernel in Accordance with RTCA DO-178C Considerations,”</a:t>
+            </a:r>
+            <a:r>
+              <a:rPr lang="en-US" sz="1200" dirty="0">
                 <a:latin typeface="Roboto" panose="02000000000000000000" pitchFamily="2" charset="0"/>
                 <a:ea typeface="Roboto" panose="02000000000000000000" pitchFamily="2" charset="0"/>
                 <a:cs typeface="Roboto" panose="02000000000000000000" pitchFamily="2" charset="0"/>
@@ -6462,6 +6614,83 @@
           </a:prstGeom>
         </p:spPr>
       </p:pic>
+      <p:pic>
+        <p:nvPicPr>
+          <p:cNvPr id="4" name="Picture 3">
+            <a:extLst>
+              <a:ext uri="{FF2B5EF4-FFF2-40B4-BE49-F238E27FC236}">
+                <a16:creationId xmlns:a16="http://schemas.microsoft.com/office/drawing/2014/main" id="{E7392EAE-BA42-4F1D-69EC-10AEF08B5D63}"/>
+              </a:ext>
+            </a:extLst>
+          </p:cNvPr>
+          <p:cNvPicPr>
+            <a:picLocks noChangeAspect="1"/>
+          </p:cNvPicPr>
+          <p:nvPr/>
+        </p:nvPicPr>
+        <p:blipFill>
+          <a:blip r:embed="rId10"/>
+          <a:stretch>
+            <a:fillRect/>
+          </a:stretch>
+        </p:blipFill>
+        <p:spPr>
+          <a:xfrm>
+            <a:off x="6346633" y="2797427"/>
+            <a:ext cx="2631171" cy="1193598"/>
+          </a:xfrm>
+          <a:prstGeom prst="rect">
+            <a:avLst/>
+          </a:prstGeom>
+        </p:spPr>
+      </p:pic>
+      <p:sp>
+        <p:nvSpPr>
+          <p:cNvPr id="5" name="Right Brace 4">
+            <a:extLst>
+              <a:ext uri="{FF2B5EF4-FFF2-40B4-BE49-F238E27FC236}">
+                <a16:creationId xmlns:a16="http://schemas.microsoft.com/office/drawing/2014/main" id="{6A89BE11-DF6E-3174-38FF-5C0430EEBA9E}"/>
+              </a:ext>
+            </a:extLst>
+          </p:cNvPr>
+          <p:cNvSpPr/>
+          <p:nvPr/>
+        </p:nvSpPr>
+        <p:spPr>
+          <a:xfrm>
+            <a:off x="5647765" y="2571750"/>
+            <a:ext cx="676108" cy="1910603"/>
+          </a:xfrm>
+          <a:prstGeom prst="rightBrace">
+            <a:avLst>
+              <a:gd name="adj1" fmla="val 8333"/>
+              <a:gd name="adj2" fmla="val 42493"/>
+            </a:avLst>
+          </a:prstGeom>
+        </p:spPr>
+        <p:style>
+          <a:lnRef idx="1">
+            <a:schemeClr val="accent1"/>
+          </a:lnRef>
+          <a:fillRef idx="0">
+            <a:schemeClr val="accent1"/>
+          </a:fillRef>
+          <a:effectRef idx="0">
+            <a:schemeClr val="accent1"/>
+          </a:effectRef>
+          <a:fontRef idx="minor">
+            <a:schemeClr val="tx1"/>
+          </a:fontRef>
+        </p:style>
+        <p:txBody>
+          <a:bodyPr rtlCol="0" anchor="ctr"/>
+          <a:lstStyle/>
+          <a:p>
+            <a:pPr algn="ctr"/>
+            <a:endParaRPr lang="en-US"/>
+          </a:p>
+        </p:txBody>
+      </p:sp>
     </p:spTree>
     <p:extLst>
       <p:ext uri="{BB962C8B-B14F-4D97-AF65-F5344CB8AC3E}">
@@ -6540,7 +6769,7 @@
             </a:pPr>
             <a:r>
               <a:rPr lang="en-US" dirty="0"/>
-              <a:t>Current Focus and Activities</a:t>
+              <a:t>Current Focus and 2025 Activities</a:t>
             </a:r>
             <a:endParaRPr dirty="0"/>
           </a:p>
@@ -6565,7 +6794,7 @@
         <p:spPr>
           <a:xfrm>
             <a:off x="311700" y="1152475"/>
-            <a:ext cx="8520600" cy="3050100"/>
+            <a:ext cx="5300206" cy="3050100"/>
           </a:xfrm>
           <a:prstGeom prst="rect">
             <a:avLst/>
@@ -6584,7 +6813,7 @@
                 <a:ea typeface="Roboto" panose="02000000000000000000" pitchFamily="2" charset="0"/>
                 <a:cs typeface="Roboto" panose="02000000000000000000" pitchFamily="2" charset="0"/>
               </a:rPr>
-              <a:t>A </a:t>
+              <a:t>Use case: “Cabin Lighting”  </a:t>
             </a:r>
             <a:r>
               <a:rPr lang="en-US" dirty="0">
@@ -6593,19 +6822,8 @@
                 <a:cs typeface="Roboto" panose="02000000000000000000" pitchFamily="2" charset="0"/>
                 <a:hlinkClick r:id="rId3"/>
               </a:rPr>
-              <a:t>verification demo </a:t>
-            </a:r>
-            <a:r>
-              <a:rPr lang="en-US" dirty="0">
-                <a:latin typeface="Roboto" panose="02000000000000000000" pitchFamily="2" charset="0"/>
-                <a:ea typeface="Roboto" panose="02000000000000000000" pitchFamily="2" charset="0"/>
-                <a:cs typeface="Roboto" panose="02000000000000000000" pitchFamily="2" charset="0"/>
-              </a:rPr>
-              <a:t>of the “Cabin Lighting” use case</a:t>
-            </a:r>
-          </a:p>
-          <a:p>
-            <a:pPr algn="l"/>
+              <a:t>verification demos </a:t>
+            </a:r>
             <a:endParaRPr lang="en-US" dirty="0">
               <a:latin typeface="Roboto" panose="02000000000000000000" pitchFamily="2" charset="0"/>
               <a:ea typeface="Roboto" panose="02000000000000000000" pitchFamily="2" charset="0"/>
@@ -6613,14 +6831,14 @@
             </a:endParaRPr>
           </a:p>
           <a:p>
-            <a:pPr algn="l"/>
+            <a:pPr lvl="1"/>
             <a:r>
               <a:rPr lang="en-US" dirty="0">
                 <a:latin typeface="Roboto" panose="02000000000000000000" pitchFamily="2" charset="0"/>
                 <a:ea typeface="Roboto" panose="02000000000000000000" pitchFamily="2" charset="0"/>
                 <a:cs typeface="Roboto" panose="02000000000000000000" pitchFamily="2" charset="0"/>
               </a:rPr>
-              <a:t>Establishing code repositories</a:t>
+              <a:t>Prebuilt images</a:t>
             </a:r>
           </a:p>
           <a:p>
@@ -6631,86 +6849,52 @@
                 <a:ea typeface="Roboto" panose="02000000000000000000" pitchFamily="2" charset="0"/>
                 <a:cs typeface="Roboto" panose="02000000000000000000" pitchFamily="2" charset="0"/>
               </a:rPr>
-              <a:t>Licensing plan</a:t>
+              <a:t>Basic examples of current use case</a:t>
             </a:r>
           </a:p>
           <a:p>
-            <a:pPr lvl="2"/>
+            <a:pPr lvl="1"/>
             <a:r>
               <a:rPr lang="en-US" dirty="0">
                 <a:latin typeface="Roboto" panose="02000000000000000000" pitchFamily="2" charset="0"/>
                 <a:ea typeface="Roboto" panose="02000000000000000000" pitchFamily="2" charset="0"/>
                 <a:cs typeface="Roboto" panose="02000000000000000000" pitchFamily="2" charset="0"/>
               </a:rPr>
-              <a:t>Space Grade Linux has an example of the CC-BY-SA-4 and MIT license approach (</a:t>
-            </a:r>
+              <a:t>Advanced examples</a:t>
+            </a:r>
+          </a:p>
+          <a:p>
+            <a:pPr lvl="2"/>
             <a:r>
               <a:rPr lang="en-US" dirty="0">
                 <a:latin typeface="Roboto" panose="02000000000000000000" pitchFamily="2" charset="0"/>
                 <a:ea typeface="Roboto" panose="02000000000000000000" pitchFamily="2" charset="0"/>
                 <a:cs typeface="Roboto" panose="02000000000000000000" pitchFamily="2" charset="0"/>
-                <a:hlinkClick r:id="rId4"/>
-              </a:rPr>
-              <a:t>https://github.com/elisa-tech/meta-sgl/blob/main/LICENSE</a:t>
-            </a:r>
+              </a:rPr>
+              <a:t>Adjusting test apps</a:t>
+            </a:r>
+          </a:p>
+          <a:p>
+            <a:pPr lvl="2"/>
             <a:r>
               <a:rPr lang="en-US" dirty="0">
                 <a:latin typeface="Roboto" panose="02000000000000000000" pitchFamily="2" charset="0"/>
                 <a:ea typeface="Roboto" panose="02000000000000000000" pitchFamily="2" charset="0"/>
                 <a:cs typeface="Roboto" panose="02000000000000000000" pitchFamily="2" charset="0"/>
               </a:rPr>
-              <a:t>)</a:t>
+              <a:t>Configuring operating system </a:t>
             </a:r>
           </a:p>
           <a:p>
-            <a:pPr lvl="1"/>
+            <a:pPr lvl="2"/>
             <a:r>
               <a:rPr lang="en-US" dirty="0">
                 <a:latin typeface="Roboto" panose="02000000000000000000" pitchFamily="2" charset="0"/>
                 <a:ea typeface="Roboto" panose="02000000000000000000" pitchFamily="2" charset="0"/>
                 <a:cs typeface="Roboto" panose="02000000000000000000" pitchFamily="2" charset="0"/>
               </a:rPr>
-              <a:t>Automation plan – Combination of </a:t>
-            </a:r>
-            <a:r>
-              <a:rPr lang="en-US" dirty="0">
-                <a:latin typeface="Roboto" panose="02000000000000000000" pitchFamily="2" charset="0"/>
-                <a:ea typeface="Roboto" panose="02000000000000000000" pitchFamily="2" charset="0"/>
-                <a:cs typeface="Roboto" panose="02000000000000000000" pitchFamily="2" charset="0"/>
-                <a:hlinkClick r:id="rId5"/>
-              </a:rPr>
-              <a:t>GitHub</a:t>
-            </a:r>
-            <a:r>
-              <a:rPr lang="en-US" dirty="0">
-                <a:latin typeface="Roboto" panose="02000000000000000000" pitchFamily="2" charset="0"/>
-                <a:ea typeface="Roboto" panose="02000000000000000000" pitchFamily="2" charset="0"/>
-                <a:cs typeface="Roboto" panose="02000000000000000000" pitchFamily="2" charset="0"/>
-              </a:rPr>
-              <a:t> and </a:t>
-            </a:r>
-            <a:r>
-              <a:rPr lang="en-US" dirty="0">
-                <a:latin typeface="Roboto" panose="02000000000000000000" pitchFamily="2" charset="0"/>
-                <a:ea typeface="Roboto" panose="02000000000000000000" pitchFamily="2" charset="0"/>
-                <a:cs typeface="Roboto" panose="02000000000000000000" pitchFamily="2" charset="0"/>
-                <a:hlinkClick r:id="rId6"/>
-              </a:rPr>
-              <a:t>GitLab</a:t>
-            </a:r>
-            <a:endParaRPr lang="en-US" dirty="0">
-              <a:latin typeface="Roboto" panose="02000000000000000000" pitchFamily="2" charset="0"/>
-              <a:ea typeface="Roboto" panose="02000000000000000000" pitchFamily="2" charset="0"/>
-              <a:cs typeface="Roboto" panose="02000000000000000000" pitchFamily="2" charset="0"/>
-            </a:endParaRPr>
-          </a:p>
-          <a:p>
-            <a:pPr algn="l"/>
-            <a:endParaRPr lang="en-US" dirty="0">
-              <a:latin typeface="Roboto" panose="02000000000000000000" pitchFamily="2" charset="0"/>
-              <a:ea typeface="Roboto" panose="02000000000000000000" pitchFamily="2" charset="0"/>
-              <a:cs typeface="Roboto" panose="02000000000000000000" pitchFamily="2" charset="0"/>
-            </a:endParaRPr>
+              <a:t>Building test harness and monitors</a:t>
+            </a:r>
           </a:p>
           <a:p>
             <a:pPr algn="l"/>
@@ -7004,7 +7188,7 @@
           <p:nvPr/>
         </p:nvPicPr>
         <p:blipFill>
-          <a:blip r:embed="rId7"/>
+          <a:blip r:embed="rId4"/>
           <a:stretch>
             <a:fillRect/>
           </a:stretch>
@@ -7013,6 +7197,36 @@
           <a:xfrm>
             <a:off x="7880325" y="300878"/>
             <a:ext cx="854100" cy="854100"/>
+          </a:xfrm>
+          <a:prstGeom prst="rect">
+            <a:avLst/>
+          </a:prstGeom>
+        </p:spPr>
+      </p:pic>
+      <p:pic>
+        <p:nvPicPr>
+          <p:cNvPr id="2" name="Picture 1">
+            <a:extLst>
+              <a:ext uri="{FF2B5EF4-FFF2-40B4-BE49-F238E27FC236}">
+                <a16:creationId xmlns:a16="http://schemas.microsoft.com/office/drawing/2014/main" id="{E3FB8130-570B-3660-9B2B-04BDA83797B2}"/>
+              </a:ext>
+            </a:extLst>
+          </p:cNvPr>
+          <p:cNvPicPr>
+            <a:picLocks noChangeAspect="1"/>
+          </p:cNvPicPr>
+          <p:nvPr/>
+        </p:nvPicPr>
+        <p:blipFill>
+          <a:blip r:embed="rId5"/>
+          <a:stretch>
+            <a:fillRect/>
+          </a:stretch>
+        </p:blipFill>
+        <p:spPr>
+          <a:xfrm>
+            <a:off x="5970495" y="1458610"/>
+            <a:ext cx="2571082" cy="2743965"/>
           </a:xfrm>
           <a:prstGeom prst="rect">
             <a:avLst/>
@@ -7122,7 +7336,7 @@
         <p:spPr>
           <a:xfrm>
             <a:off x="311700" y="1152475"/>
-            <a:ext cx="8520600" cy="3050100"/>
+            <a:ext cx="5192629" cy="3050100"/>
           </a:xfrm>
           <a:prstGeom prst="rect">
             <a:avLst/>
@@ -7177,7 +7391,22 @@
                 <a:ea typeface="Roboto" panose="02000000000000000000" pitchFamily="2" charset="0"/>
                 <a:cs typeface="Roboto" panose="02000000000000000000" pitchFamily="2" charset="0"/>
               </a:rPr>
-              <a:t>Adding flight framework comparison (F’ / </a:t>
+              <a:t>Adding flight framework comparison </a:t>
+            </a:r>
+            <a:br>
+              <a:rPr lang="en-US" dirty="0">
+                <a:latin typeface="Roboto" panose="02000000000000000000" pitchFamily="2" charset="0"/>
+                <a:ea typeface="Roboto" panose="02000000000000000000" pitchFamily="2" charset="0"/>
+                <a:cs typeface="Roboto" panose="02000000000000000000" pitchFamily="2" charset="0"/>
+              </a:rPr>
+            </a:br>
+            <a:r>
+              <a:rPr lang="en-US" dirty="0">
+                <a:latin typeface="Roboto" panose="02000000000000000000" pitchFamily="2" charset="0"/>
+                <a:ea typeface="Roboto" panose="02000000000000000000" pitchFamily="2" charset="0"/>
+                <a:cs typeface="Roboto" panose="02000000000000000000" pitchFamily="2" charset="0"/>
+              </a:rPr>
+              <a:t>(F’ / </a:t>
             </a:r>
             <a:r>
               <a:rPr lang="en-US" dirty="0" err="1">
@@ -7220,7 +7449,22 @@
                 <a:ea typeface="Roboto" panose="02000000000000000000" pitchFamily="2" charset="0"/>
                 <a:cs typeface="Roboto" panose="02000000000000000000" pitchFamily="2" charset="0"/>
               </a:rPr>
-              <a:t>Survey on satellite use of Linux (SAT GUS / </a:t>
+              <a:t>Survey on satellite use of Linux </a:t>
+            </a:r>
+            <a:br>
+              <a:rPr lang="en-US" dirty="0">
+                <a:latin typeface="Roboto" panose="02000000000000000000" pitchFamily="2" charset="0"/>
+                <a:ea typeface="Roboto" panose="02000000000000000000" pitchFamily="2" charset="0"/>
+                <a:cs typeface="Roboto" panose="02000000000000000000" pitchFamily="2" charset="0"/>
+              </a:rPr>
+            </a:br>
+            <a:r>
+              <a:rPr lang="en-US" dirty="0">
+                <a:latin typeface="Roboto" panose="02000000000000000000" pitchFamily="2" charset="0"/>
+                <a:ea typeface="Roboto" panose="02000000000000000000" pitchFamily="2" charset="0"/>
+                <a:cs typeface="Roboto" panose="02000000000000000000" pitchFamily="2" charset="0"/>
+              </a:rPr>
+              <a:t>(SAT GUS / </a:t>
             </a:r>
             <a:r>
               <a:rPr lang="en-US" dirty="0" err="1">
@@ -7237,61 +7481,6 @@
                 <a:cs typeface="Roboto" panose="02000000000000000000" pitchFamily="2" charset="0"/>
               </a:rPr>
               <a:t> / …)</a:t>
-            </a:r>
-          </a:p>
-          <a:p>
-            <a:pPr algn="l"/>
-            <a:endParaRPr lang="en-US" dirty="0">
-              <a:latin typeface="Roboto" panose="02000000000000000000" pitchFamily="2" charset="0"/>
-              <a:ea typeface="Roboto" panose="02000000000000000000" pitchFamily="2" charset="0"/>
-              <a:cs typeface="Roboto" panose="02000000000000000000" pitchFamily="2" charset="0"/>
-            </a:endParaRPr>
-          </a:p>
-          <a:p>
-            <a:pPr algn="l"/>
-            <a:r>
-              <a:rPr lang="en-US" dirty="0">
-                <a:latin typeface="Roboto" panose="02000000000000000000" pitchFamily="2" charset="0"/>
-                <a:ea typeface="Roboto" panose="02000000000000000000" pitchFamily="2" charset="0"/>
-                <a:cs typeface="Roboto" panose="02000000000000000000" pitchFamily="2" charset="0"/>
-              </a:rPr>
-              <a:t>Publish a “Cabin Lighting” use-cases with a practical </a:t>
-            </a:r>
-            <a:r>
-              <a:rPr lang="en-US" dirty="0">
-                <a:latin typeface="Roboto" panose="02000000000000000000" pitchFamily="2" charset="0"/>
-                <a:ea typeface="Roboto" panose="02000000000000000000" pitchFamily="2" charset="0"/>
-                <a:cs typeface="Roboto" panose="02000000000000000000" pitchFamily="2" charset="0"/>
-                <a:hlinkClick r:id="rId4"/>
-              </a:rPr>
-              <a:t>verification</a:t>
-            </a:r>
-            <a:r>
-              <a:rPr lang="en-US" dirty="0">
-                <a:latin typeface="Roboto" panose="02000000000000000000" pitchFamily="2" charset="0"/>
-                <a:ea typeface="Roboto" panose="02000000000000000000" pitchFamily="2" charset="0"/>
-                <a:cs typeface="Roboto" panose="02000000000000000000" pitchFamily="2" charset="0"/>
-              </a:rPr>
-              <a:t> example</a:t>
-            </a:r>
-          </a:p>
-          <a:p>
-            <a:pPr algn="l"/>
-            <a:endParaRPr lang="en-US" dirty="0">
-              <a:latin typeface="Roboto" panose="02000000000000000000" pitchFamily="2" charset="0"/>
-              <a:ea typeface="Roboto" panose="02000000000000000000" pitchFamily="2" charset="0"/>
-              <a:cs typeface="Roboto" panose="02000000000000000000" pitchFamily="2" charset="0"/>
-            </a:endParaRPr>
-          </a:p>
-          <a:p>
-            <a:pPr algn="l"/>
-            <a:r>
-              <a:rPr lang="en-US" dirty="0">
-                <a:latin typeface="Roboto" panose="02000000000000000000" pitchFamily="2" charset="0"/>
-                <a:ea typeface="Roboto" panose="02000000000000000000" pitchFamily="2" charset="0"/>
-                <a:cs typeface="Roboto" panose="02000000000000000000" pitchFamily="2" charset="0"/>
-              </a:rPr>
-              <a:t>Support standardization of Linux Kernel Requirements and Test trace</a:t>
             </a:r>
           </a:p>
         </p:txBody>
@@ -7570,7 +7759,566 @@
           <p:nvPr/>
         </p:nvPicPr>
         <p:blipFill>
+          <a:blip r:embed="rId4"/>
+          <a:stretch>
+            <a:fillRect/>
+          </a:stretch>
+        </p:blipFill>
+        <p:spPr>
+          <a:xfrm>
+            <a:off x="7880325" y="300878"/>
+            <a:ext cx="854100" cy="854100"/>
+          </a:xfrm>
+          <a:prstGeom prst="rect">
+            <a:avLst/>
+          </a:prstGeom>
+        </p:spPr>
+      </p:pic>
+      <p:pic>
+        <p:nvPicPr>
+          <p:cNvPr id="4" name="Picture 3">
+            <a:extLst>
+              <a:ext uri="{FF2B5EF4-FFF2-40B4-BE49-F238E27FC236}">
+                <a16:creationId xmlns:a16="http://schemas.microsoft.com/office/drawing/2014/main" id="{569C7FDE-CC54-2446-E800-D52F3D7A3A6C}"/>
+              </a:ext>
+            </a:extLst>
+          </p:cNvPr>
+          <p:cNvPicPr>
+            <a:picLocks noChangeAspect="1"/>
+          </p:cNvPicPr>
+          <p:nvPr/>
+        </p:nvPicPr>
+        <p:blipFill>
           <a:blip r:embed="rId5"/>
+          <a:stretch>
+            <a:fillRect/>
+          </a:stretch>
+        </p:blipFill>
+        <p:spPr>
+          <a:xfrm>
+            <a:off x="4870950" y="2226605"/>
+            <a:ext cx="3994482" cy="2235008"/>
+          </a:xfrm>
+          <a:prstGeom prst="rect">
+            <a:avLst/>
+          </a:prstGeom>
+          <a:ln>
+            <a:solidFill>
+              <a:schemeClr val="tx1"/>
+            </a:solidFill>
+          </a:ln>
+        </p:spPr>
+      </p:pic>
+    </p:spTree>
+    <p:extLst>
+      <p:ext uri="{BB962C8B-B14F-4D97-AF65-F5344CB8AC3E}">
+        <p14:creationId xmlns:p14="http://schemas.microsoft.com/office/powerpoint/2010/main" val="1251410641"/>
+      </p:ext>
+    </p:extLst>
+  </p:cSld>
+  <p:clrMapOvr>
+    <a:masterClrMapping/>
+  </p:clrMapOvr>
+</p:sld>
+</file>
+
+<file path=ppt/slides/slide7.xml><?xml version="1.0" encoding="utf-8"?>
+<p:sld xmlns:a="http://schemas.openxmlformats.org/drawingml/2006/main" xmlns:r="http://schemas.openxmlformats.org/officeDocument/2006/relationships" xmlns:p="http://schemas.openxmlformats.org/presentationml/2006/main">
+  <p:cSld>
+    <p:spTree>
+      <p:nvGrpSpPr>
+        <p:cNvPr id="1" name="Shape 54">
+          <a:extLst>
+            <a:ext uri="{FF2B5EF4-FFF2-40B4-BE49-F238E27FC236}">
+              <a16:creationId xmlns:a16="http://schemas.microsoft.com/office/drawing/2014/main" id="{E962C852-A85E-20F5-66CF-78200956CBC1}"/>
+            </a:ext>
+          </a:extLst>
+        </p:cNvPr>
+        <p:cNvGrpSpPr/>
+        <p:nvPr/>
+      </p:nvGrpSpPr>
+      <p:grpSpPr>
+        <a:xfrm>
+          <a:off x="0" y="0"/>
+          <a:ext cx="0" cy="0"/>
+          <a:chOff x="0" y="0"/>
+          <a:chExt cx="0" cy="0"/>
+        </a:xfrm>
+      </p:grpSpPr>
+      <p:sp>
+        <p:nvSpPr>
+          <p:cNvPr id="55" name="Google Shape;55;p9">
+            <a:extLst>
+              <a:ext uri="{FF2B5EF4-FFF2-40B4-BE49-F238E27FC236}">
+                <a16:creationId xmlns:a16="http://schemas.microsoft.com/office/drawing/2014/main" id="{8509B3CB-54FD-6CB9-4C96-82A8568103F4}"/>
+              </a:ext>
+            </a:extLst>
+          </p:cNvPr>
+          <p:cNvSpPr txBox="1">
+            <a:spLocks noGrp="1"/>
+          </p:cNvSpPr>
+          <p:nvPr>
+            <p:ph type="title"/>
+          </p:nvPr>
+        </p:nvSpPr>
+        <p:spPr>
+          <a:xfrm>
+            <a:off x="311700" y="445025"/>
+            <a:ext cx="8520600" cy="572700"/>
+          </a:xfrm>
+          <a:prstGeom prst="rect">
+            <a:avLst/>
+          </a:prstGeom>
+        </p:spPr>
+        <p:txBody>
+          <a:bodyPr spcFirstLastPara="1" wrap="square" lIns="91425" tIns="91425" rIns="91425" bIns="91425" anchor="t" anchorCtr="0">
+            <a:noAutofit/>
+          </a:bodyPr>
+          <a:lstStyle/>
+          <a:p>
+            <a:pPr marL="0" lvl="0" indent="0" algn="l" rtl="0">
+              <a:spcBef>
+                <a:spcPts val="0"/>
+              </a:spcBef>
+              <a:spcAft>
+                <a:spcPts val="0"/>
+              </a:spcAft>
+              <a:buNone/>
+            </a:pPr>
+            <a:r>
+              <a:rPr lang="en-US" dirty="0"/>
+              <a:t>What’s Coming in 2025</a:t>
+            </a:r>
+            <a:endParaRPr dirty="0"/>
+          </a:p>
+        </p:txBody>
+      </p:sp>
+      <p:sp>
+        <p:nvSpPr>
+          <p:cNvPr id="56" name="Google Shape;56;p9">
+            <a:extLst>
+              <a:ext uri="{FF2B5EF4-FFF2-40B4-BE49-F238E27FC236}">
+                <a16:creationId xmlns:a16="http://schemas.microsoft.com/office/drawing/2014/main" id="{36C0E443-D73E-7B8C-C378-91C4CFEF46C3}"/>
+              </a:ext>
+            </a:extLst>
+          </p:cNvPr>
+          <p:cNvSpPr txBox="1">
+            <a:spLocks noGrp="1"/>
+          </p:cNvSpPr>
+          <p:nvPr>
+            <p:ph type="body" idx="1"/>
+          </p:nvPr>
+        </p:nvSpPr>
+        <p:spPr>
+          <a:xfrm>
+            <a:off x="311699" y="1152475"/>
+            <a:ext cx="8159947" cy="3050100"/>
+          </a:xfrm>
+          <a:prstGeom prst="rect">
+            <a:avLst/>
+          </a:prstGeom>
+        </p:spPr>
+        <p:txBody>
+          <a:bodyPr spcFirstLastPara="1" wrap="square" lIns="91425" tIns="91425" rIns="91425" bIns="91425" anchor="t" anchorCtr="0">
+            <a:noAutofit/>
+          </a:bodyPr>
+          <a:lstStyle/>
+          <a:p>
+            <a:pPr algn="l"/>
+            <a:r>
+              <a:rPr lang="en-US" dirty="0">
+                <a:latin typeface="Roboto" panose="02000000000000000000" pitchFamily="2" charset="0"/>
+                <a:ea typeface="Roboto" panose="02000000000000000000" pitchFamily="2" charset="0"/>
+                <a:cs typeface="Roboto" panose="02000000000000000000" pitchFamily="2" charset="0"/>
+              </a:rPr>
+              <a:t>Establishing code repositories</a:t>
+            </a:r>
+          </a:p>
+          <a:p>
+            <a:pPr lvl="1"/>
+            <a:r>
+              <a:rPr lang="en-US" dirty="0">
+                <a:latin typeface="Roboto" panose="02000000000000000000" pitchFamily="2" charset="0"/>
+                <a:ea typeface="Roboto" panose="02000000000000000000" pitchFamily="2" charset="0"/>
+                <a:cs typeface="Roboto" panose="02000000000000000000" pitchFamily="2" charset="0"/>
+              </a:rPr>
+              <a:t>Licensing plan</a:t>
+            </a:r>
+          </a:p>
+          <a:p>
+            <a:pPr lvl="2"/>
+            <a:r>
+              <a:rPr lang="en-US" dirty="0">
+                <a:latin typeface="Roboto" panose="02000000000000000000" pitchFamily="2" charset="0"/>
+                <a:ea typeface="Roboto" panose="02000000000000000000" pitchFamily="2" charset="0"/>
+                <a:cs typeface="Roboto" panose="02000000000000000000" pitchFamily="2" charset="0"/>
+              </a:rPr>
+              <a:t>Space Grade Linux has an example of the CC-BY-SA-4 and MIT license approach (</a:t>
+            </a:r>
+            <a:r>
+              <a:rPr lang="en-US" dirty="0">
+                <a:latin typeface="Roboto" panose="02000000000000000000" pitchFamily="2" charset="0"/>
+                <a:ea typeface="Roboto" panose="02000000000000000000" pitchFamily="2" charset="0"/>
+                <a:cs typeface="Roboto" panose="02000000000000000000" pitchFamily="2" charset="0"/>
+                <a:hlinkClick r:id="rId3"/>
+              </a:rPr>
+              <a:t>https://github.com/elisa-tech/meta-sgl/blob/main/LICENSE</a:t>
+            </a:r>
+            <a:r>
+              <a:rPr lang="en-US" dirty="0">
+                <a:latin typeface="Roboto" panose="02000000000000000000" pitchFamily="2" charset="0"/>
+                <a:ea typeface="Roboto" panose="02000000000000000000" pitchFamily="2" charset="0"/>
+                <a:cs typeface="Roboto" panose="02000000000000000000" pitchFamily="2" charset="0"/>
+              </a:rPr>
+              <a:t>)</a:t>
+            </a:r>
+          </a:p>
+          <a:p>
+            <a:pPr lvl="1"/>
+            <a:r>
+              <a:rPr lang="en-US" dirty="0">
+                <a:latin typeface="Roboto" panose="02000000000000000000" pitchFamily="2" charset="0"/>
+                <a:ea typeface="Roboto" panose="02000000000000000000" pitchFamily="2" charset="0"/>
+                <a:cs typeface="Roboto" panose="02000000000000000000" pitchFamily="2" charset="0"/>
+              </a:rPr>
+              <a:t>Automation plan – Combination of </a:t>
+            </a:r>
+            <a:r>
+              <a:rPr lang="en-US" dirty="0">
+                <a:latin typeface="Roboto" panose="02000000000000000000" pitchFamily="2" charset="0"/>
+                <a:ea typeface="Roboto" panose="02000000000000000000" pitchFamily="2" charset="0"/>
+                <a:cs typeface="Roboto" panose="02000000000000000000" pitchFamily="2" charset="0"/>
+                <a:hlinkClick r:id="rId4"/>
+              </a:rPr>
+              <a:t>GitHub</a:t>
+            </a:r>
+            <a:r>
+              <a:rPr lang="en-US" dirty="0">
+                <a:latin typeface="Roboto" panose="02000000000000000000" pitchFamily="2" charset="0"/>
+                <a:ea typeface="Roboto" panose="02000000000000000000" pitchFamily="2" charset="0"/>
+                <a:cs typeface="Roboto" panose="02000000000000000000" pitchFamily="2" charset="0"/>
+              </a:rPr>
+              <a:t> and </a:t>
+            </a:r>
+            <a:r>
+              <a:rPr lang="en-US" dirty="0">
+                <a:latin typeface="Roboto" panose="02000000000000000000" pitchFamily="2" charset="0"/>
+                <a:ea typeface="Roboto" panose="02000000000000000000" pitchFamily="2" charset="0"/>
+                <a:cs typeface="Roboto" panose="02000000000000000000" pitchFamily="2" charset="0"/>
+                <a:hlinkClick r:id="rId5"/>
+              </a:rPr>
+              <a:t>GitLab</a:t>
+            </a:r>
+            <a:endParaRPr lang="en-US" dirty="0">
+              <a:latin typeface="Roboto" panose="02000000000000000000" pitchFamily="2" charset="0"/>
+              <a:ea typeface="Roboto" panose="02000000000000000000" pitchFamily="2" charset="0"/>
+              <a:cs typeface="Roboto" panose="02000000000000000000" pitchFamily="2" charset="0"/>
+            </a:endParaRPr>
+          </a:p>
+          <a:p>
+            <a:pPr algn="l"/>
+            <a:endParaRPr lang="en-US" dirty="0">
+              <a:latin typeface="Roboto" panose="02000000000000000000" pitchFamily="2" charset="0"/>
+              <a:ea typeface="Roboto" panose="02000000000000000000" pitchFamily="2" charset="0"/>
+              <a:cs typeface="Roboto" panose="02000000000000000000" pitchFamily="2" charset="0"/>
+            </a:endParaRPr>
+          </a:p>
+          <a:p>
+            <a:pPr algn="l"/>
+            <a:endParaRPr lang="en-US" dirty="0">
+              <a:latin typeface="Roboto" panose="02000000000000000000" pitchFamily="2" charset="0"/>
+              <a:ea typeface="Roboto" panose="02000000000000000000" pitchFamily="2" charset="0"/>
+              <a:cs typeface="Roboto" panose="02000000000000000000" pitchFamily="2" charset="0"/>
+            </a:endParaRPr>
+          </a:p>
+          <a:p>
+            <a:pPr algn="l"/>
+            <a:r>
+              <a:rPr lang="en-US" dirty="0">
+                <a:latin typeface="Roboto" panose="02000000000000000000" pitchFamily="2" charset="0"/>
+                <a:ea typeface="Roboto" panose="02000000000000000000" pitchFamily="2" charset="0"/>
+                <a:cs typeface="Roboto" panose="02000000000000000000" pitchFamily="2" charset="0"/>
+              </a:rPr>
+              <a:t>Apply Linux Kernel Requirements and Test trace practice from ELISA Safety Architecture group</a:t>
+            </a:r>
+          </a:p>
+        </p:txBody>
+      </p:sp>
+      <p:sp>
+        <p:nvSpPr>
+          <p:cNvPr id="57" name="Google Shape;57;p9">
+            <a:extLst>
+              <a:ext uri="{FF2B5EF4-FFF2-40B4-BE49-F238E27FC236}">
+                <a16:creationId xmlns:a16="http://schemas.microsoft.com/office/drawing/2014/main" id="{BBDFBB62-D2A8-08AA-A789-B3A436CBE7AC}"/>
+              </a:ext>
+            </a:extLst>
+          </p:cNvPr>
+          <p:cNvSpPr txBox="1"/>
+          <p:nvPr/>
+        </p:nvSpPr>
+        <p:spPr>
+          <a:xfrm>
+            <a:off x="1091700" y="4720650"/>
+            <a:ext cx="7558500" cy="323100"/>
+          </a:xfrm>
+          <a:prstGeom prst="rect">
+            <a:avLst/>
+          </a:prstGeom>
+          <a:noFill/>
+          <a:ln>
+            <a:noFill/>
+          </a:ln>
+        </p:spPr>
+        <p:txBody>
+          <a:bodyPr spcFirstLastPara="1" wrap="square" lIns="91425" tIns="91425" rIns="91425" bIns="91425" anchor="t" anchorCtr="0">
+            <a:spAutoFit/>
+          </a:bodyPr>
+          <a:lstStyle/>
+          <a:p>
+            <a:pPr marL="0" lvl="0" indent="0" algn="l" rtl="0">
+              <a:lnSpc>
+                <a:spcPct val="157142"/>
+              </a:lnSpc>
+              <a:spcBef>
+                <a:spcPts val="0"/>
+              </a:spcBef>
+              <a:spcAft>
+                <a:spcPts val="0"/>
+              </a:spcAft>
+              <a:buNone/>
+            </a:pPr>
+            <a:r>
+              <a:rPr lang="en" sz="900">
+                <a:solidFill>
+                  <a:srgbClr val="F5F4F3"/>
+                </a:solidFill>
+                <a:latin typeface="Roboto"/>
+                <a:ea typeface="Roboto"/>
+                <a:cs typeface="Roboto"/>
+                <a:sym typeface="Roboto"/>
+              </a:rPr>
+              <a:t>Aerospace</a:t>
+            </a:r>
+            <a:r>
+              <a:rPr lang="en" sz="900">
+                <a:solidFill>
+                  <a:schemeClr val="accent6"/>
+                </a:solidFill>
+                <a:latin typeface="Roboto"/>
+                <a:ea typeface="Roboto"/>
+                <a:cs typeface="Roboto"/>
+                <a:sym typeface="Roboto"/>
+              </a:rPr>
+              <a:t> · </a:t>
+            </a:r>
+            <a:r>
+              <a:rPr lang="en" sz="900">
+                <a:solidFill>
+                  <a:srgbClr val="F5F4F3"/>
+                </a:solidFill>
+                <a:latin typeface="Roboto"/>
+                <a:ea typeface="Roboto"/>
+                <a:cs typeface="Roboto"/>
+                <a:sym typeface="Roboto"/>
+              </a:rPr>
+              <a:t>Automotive</a:t>
+            </a:r>
+            <a:r>
+              <a:rPr lang="en" sz="900">
+                <a:solidFill>
+                  <a:schemeClr val="accent6"/>
+                </a:solidFill>
+                <a:latin typeface="Roboto"/>
+                <a:ea typeface="Roboto"/>
+                <a:cs typeface="Roboto"/>
+                <a:sym typeface="Roboto"/>
+              </a:rPr>
+              <a:t> · </a:t>
+            </a:r>
+            <a:r>
+              <a:rPr lang="en" sz="900">
+                <a:solidFill>
+                  <a:srgbClr val="F5F4F3"/>
+                </a:solidFill>
+                <a:latin typeface="Roboto"/>
+                <a:ea typeface="Roboto"/>
+                <a:cs typeface="Roboto"/>
+                <a:sym typeface="Roboto"/>
+              </a:rPr>
+              <a:t>Linux Features</a:t>
+            </a:r>
+            <a:r>
+              <a:rPr lang="en" sz="900">
+                <a:solidFill>
+                  <a:schemeClr val="accent6"/>
+                </a:solidFill>
+                <a:latin typeface="Roboto"/>
+                <a:ea typeface="Roboto"/>
+                <a:cs typeface="Roboto"/>
+                <a:sym typeface="Roboto"/>
+              </a:rPr>
+              <a:t> · </a:t>
+            </a:r>
+            <a:r>
+              <a:rPr lang="en" sz="900">
+                <a:solidFill>
+                  <a:srgbClr val="F5F4F3"/>
+                </a:solidFill>
+                <a:latin typeface="Roboto"/>
+                <a:ea typeface="Roboto"/>
+                <a:cs typeface="Roboto"/>
+                <a:sym typeface="Roboto"/>
+              </a:rPr>
+              <a:t>Medical Devices</a:t>
+            </a:r>
+            <a:r>
+              <a:rPr lang="en" sz="900">
+                <a:solidFill>
+                  <a:schemeClr val="accent6"/>
+                </a:solidFill>
+                <a:latin typeface="Roboto"/>
+                <a:ea typeface="Roboto"/>
+                <a:cs typeface="Roboto"/>
+                <a:sym typeface="Roboto"/>
+              </a:rPr>
+              <a:t> · </a:t>
+            </a:r>
+            <a:r>
+              <a:rPr lang="en" sz="900">
+                <a:solidFill>
+                  <a:srgbClr val="F5F4F3"/>
+                </a:solidFill>
+                <a:latin typeface="Roboto"/>
+                <a:ea typeface="Roboto"/>
+                <a:cs typeface="Roboto"/>
+                <a:sym typeface="Roboto"/>
+              </a:rPr>
+              <a:t>OS Engineering Process</a:t>
+            </a:r>
+            <a:r>
+              <a:rPr lang="en" sz="900">
+                <a:solidFill>
+                  <a:schemeClr val="accent6"/>
+                </a:solidFill>
+                <a:latin typeface="Roboto"/>
+                <a:ea typeface="Roboto"/>
+                <a:cs typeface="Roboto"/>
+                <a:sym typeface="Roboto"/>
+              </a:rPr>
+              <a:t> · </a:t>
+            </a:r>
+            <a:r>
+              <a:rPr lang="en" sz="900">
+                <a:solidFill>
+                  <a:srgbClr val="F5F4F3"/>
+                </a:solidFill>
+                <a:latin typeface="Roboto"/>
+                <a:ea typeface="Roboto"/>
+                <a:cs typeface="Roboto"/>
+                <a:sym typeface="Roboto"/>
+              </a:rPr>
+              <a:t>Safety Architecture</a:t>
+            </a:r>
+            <a:r>
+              <a:rPr lang="en" sz="900">
+                <a:solidFill>
+                  <a:schemeClr val="accent6"/>
+                </a:solidFill>
+                <a:latin typeface="Roboto"/>
+                <a:ea typeface="Roboto"/>
+                <a:cs typeface="Roboto"/>
+                <a:sym typeface="Roboto"/>
+              </a:rPr>
+              <a:t> · </a:t>
+            </a:r>
+            <a:r>
+              <a:rPr lang="en" sz="900">
+                <a:solidFill>
+                  <a:srgbClr val="F5F4F3"/>
+                </a:solidFill>
+                <a:latin typeface="Roboto"/>
+                <a:ea typeface="Roboto"/>
+                <a:cs typeface="Roboto"/>
+                <a:sym typeface="Roboto"/>
+              </a:rPr>
+              <a:t>Space Grade Linux</a:t>
+            </a:r>
+            <a:r>
+              <a:rPr lang="en" sz="900">
+                <a:solidFill>
+                  <a:schemeClr val="accent6"/>
+                </a:solidFill>
+                <a:latin typeface="Roboto"/>
+                <a:ea typeface="Roboto"/>
+                <a:cs typeface="Roboto"/>
+                <a:sym typeface="Roboto"/>
+              </a:rPr>
+              <a:t> · </a:t>
+            </a:r>
+            <a:r>
+              <a:rPr lang="en" sz="900">
+                <a:solidFill>
+                  <a:srgbClr val="F5F4F3"/>
+                </a:solidFill>
+                <a:latin typeface="Roboto"/>
+                <a:ea typeface="Roboto"/>
+                <a:cs typeface="Roboto"/>
+                <a:sym typeface="Roboto"/>
+              </a:rPr>
+              <a:t>Systems</a:t>
+            </a:r>
+            <a:r>
+              <a:rPr lang="en" sz="900">
+                <a:solidFill>
+                  <a:schemeClr val="accent6"/>
+                </a:solidFill>
+                <a:latin typeface="Roboto"/>
+                <a:ea typeface="Roboto"/>
+                <a:cs typeface="Roboto"/>
+                <a:sym typeface="Roboto"/>
+              </a:rPr>
+              <a:t> · </a:t>
+            </a:r>
+            <a:r>
+              <a:rPr lang="en" sz="900">
+                <a:solidFill>
+                  <a:srgbClr val="F5F4F3"/>
+                </a:solidFill>
+                <a:latin typeface="Roboto"/>
+                <a:ea typeface="Roboto"/>
+                <a:cs typeface="Roboto"/>
+                <a:sym typeface="Roboto"/>
+              </a:rPr>
+              <a:t>Tools </a:t>
+            </a:r>
+            <a:endParaRPr sz="900">
+              <a:solidFill>
+                <a:srgbClr val="F5F4F3"/>
+              </a:solidFill>
+              <a:latin typeface="Roboto"/>
+              <a:ea typeface="Roboto"/>
+              <a:cs typeface="Roboto"/>
+              <a:sym typeface="Roboto"/>
+            </a:endParaRPr>
+          </a:p>
+        </p:txBody>
+      </p:sp>
+      <p:pic>
+        <p:nvPicPr>
+          <p:cNvPr id="3" name="Picture 2">
+            <a:extLst>
+              <a:ext uri="{FF2B5EF4-FFF2-40B4-BE49-F238E27FC236}">
+                <a16:creationId xmlns:a16="http://schemas.microsoft.com/office/drawing/2014/main" id="{131E8966-D6DE-BCCB-5A4A-5919DE78D6FA}"/>
+              </a:ext>
+            </a:extLst>
+          </p:cNvPr>
+          <p:cNvPicPr>
+            <a:picLocks noChangeAspect="1"/>
+          </p:cNvPicPr>
+          <p:nvPr/>
+        </p:nvPicPr>
+        <p:blipFill>
+          <a:blip r:embed="rId6"/>
           <a:stretch>
             <a:fillRect/>
           </a:stretch>
@@ -7588,7 +8336,7 @@
     </p:spTree>
     <p:extLst>
       <p:ext uri="{BB962C8B-B14F-4D97-AF65-F5344CB8AC3E}">
-        <p14:creationId xmlns:p14="http://schemas.microsoft.com/office/powerpoint/2010/main" val="1251410641"/>
+        <p14:creationId xmlns:p14="http://schemas.microsoft.com/office/powerpoint/2010/main" val="819846008"/>
       </p:ext>
     </p:extLst>
   </p:cSld>
@@ -7598,7 +8346,7 @@
 </p:sld>
 </file>
 
-<file path=ppt/slides/slide7.xml><?xml version="1.0" encoding="utf-8"?>
+<file path=ppt/slides/slide8.xml><?xml version="1.0" encoding="utf-8"?>
 <p:sld xmlns:a="http://schemas.openxmlformats.org/drawingml/2006/main" xmlns:r="http://schemas.openxmlformats.org/officeDocument/2006/relationships" xmlns:p="http://schemas.openxmlformats.org/presentationml/2006/main">
   <p:cSld>
     <p:spTree>
@@ -8712,23 +9460,6 @@
 </file>
 
 <file path=customXml/item1.xml><?xml version="1.0" encoding="utf-8"?>
-<p:properties xmlns:p="http://schemas.microsoft.com/office/2006/metadata/properties" xmlns:xsi="http://www.w3.org/2001/XMLSchema-instance" xmlns:pc="http://schemas.microsoft.com/office/infopath/2007/PartnerControls">
-  <documentManagement>
-    <_activity xmlns="2c13b40f-93e8-44d0-9439-bff2a3aff2ef" xsi:nil="true"/>
-  </documentManagement>
-</p:properties>
-</file>
-
-<file path=customXml/item2.xml><?xml version="1.0" encoding="utf-8"?>
-<?mso-contentType ?>
-<FormTemplates xmlns="http://schemas.microsoft.com/sharepoint/v3/contenttype/forms">
-  <Display>DocumentLibraryForm</Display>
-  <Edit>DocumentLibraryForm</Edit>
-  <New>DocumentLibraryForm</New>
-</FormTemplates>
-</file>
-
-<file path=customXml/item3.xml><?xml version="1.0" encoding="utf-8"?>
 <ct:contentTypeSchema xmlns:ct="http://schemas.microsoft.com/office/2006/metadata/contentType" xmlns:ma="http://schemas.microsoft.com/office/2006/metadata/properties/metaAttributes" ct:_="" ma:_="" ma:contentTypeName="Document" ma:contentTypeID="0x01010083BC8A387F61784BA7FCD14D3BD9BA97" ma:contentTypeVersion="9" ma:contentTypeDescription="Create a new document." ma:contentTypeScope="" ma:versionID="ab9bd752c275b64874dc0833a8669543">
   <xsd:schema xmlns:xsd="http://www.w3.org/2001/XMLSchema" xmlns:xs="http://www.w3.org/2001/XMLSchema" xmlns:p="http://schemas.microsoft.com/office/2006/metadata/properties" xmlns:ns3="2c13b40f-93e8-44d0-9439-bff2a3aff2ef" xmlns:ns4="1dedc83c-9b83-4e9e-a3ee-ea7e82b4a201" targetNamespace="http://schemas.microsoft.com/office/2006/metadata/properties" ma:root="true" ma:fieldsID="7884d37d3f3583bf67357d5b8e952c02" ns3:_="" ns4:_="">
     <xsd:import namespace="2c13b40f-93e8-44d0-9439-bff2a3aff2ef"/>
@@ -8923,32 +9654,24 @@
 </ct:contentTypeSchema>
 </file>
 
-<file path=customXml/itemProps1.xml><?xml version="1.0" encoding="utf-8"?>
-<ds:datastoreItem xmlns:ds="http://schemas.openxmlformats.org/officeDocument/2006/customXml" ds:itemID="{2E62BA38-5CD8-4CF6-B14C-B5E0E849EECA}">
-  <ds:schemaRefs>
-    <ds:schemaRef ds:uri="http://schemas.microsoft.com/office/2006/documentManagement/types"/>
-    <ds:schemaRef ds:uri="1dedc83c-9b83-4e9e-a3ee-ea7e82b4a201"/>
-    <ds:schemaRef ds:uri="http://schemas.microsoft.com/office/2006/metadata/properties"/>
-    <ds:schemaRef ds:uri="http://purl.org/dc/terms/"/>
-    <ds:schemaRef ds:uri="http://purl.org/dc/dcmitype/"/>
-    <ds:schemaRef ds:uri="http://schemas.openxmlformats.org/package/2006/metadata/core-properties"/>
-    <ds:schemaRef ds:uri="http://schemas.microsoft.com/office/infopath/2007/PartnerControls"/>
-    <ds:schemaRef ds:uri="2c13b40f-93e8-44d0-9439-bff2a3aff2ef"/>
-    <ds:schemaRef ds:uri="http://www.w3.org/XML/1998/namespace"/>
-    <ds:schemaRef ds:uri="http://purl.org/dc/elements/1.1/"/>
-  </ds:schemaRefs>
-</ds:datastoreItem>
+<file path=customXml/item2.xml><?xml version="1.0" encoding="utf-8"?>
+<?mso-contentType ?>
+<FormTemplates xmlns="http://schemas.microsoft.com/sharepoint/v3/contenttype/forms">
+  <Display>DocumentLibraryForm</Display>
+  <Edit>DocumentLibraryForm</Edit>
+  <New>DocumentLibraryForm</New>
+</FormTemplates>
 </file>
 
-<file path=customXml/itemProps2.xml><?xml version="1.0" encoding="utf-8"?>
-<ds:datastoreItem xmlns:ds="http://schemas.openxmlformats.org/officeDocument/2006/customXml" ds:itemID="{24B6D469-2EE5-4294-AD1E-F96757AC7F57}">
-  <ds:schemaRefs>
-    <ds:schemaRef ds:uri="http://schemas.microsoft.com/sharepoint/v3/contenttype/forms"/>
-  </ds:schemaRefs>
-</ds:datastoreItem>
+<file path=customXml/item3.xml><?xml version="1.0" encoding="utf-8"?>
+<p:properties xmlns:p="http://schemas.microsoft.com/office/2006/metadata/properties" xmlns:xsi="http://www.w3.org/2001/XMLSchema-instance" xmlns:pc="http://schemas.microsoft.com/office/infopath/2007/PartnerControls">
+  <documentManagement>
+    <_activity xmlns="2c13b40f-93e8-44d0-9439-bff2a3aff2ef" xsi:nil="true"/>
+  </documentManagement>
+</p:properties>
 </file>
 
-<file path=customXml/itemProps3.xml><?xml version="1.0" encoding="utf-8"?>
+<file path=customXml/itemProps1.xml><?xml version="1.0" encoding="utf-8"?>
 <ds:datastoreItem xmlns:ds="http://schemas.openxmlformats.org/officeDocument/2006/customXml" ds:itemID="{7C1E51B2-0B7C-40F5-9B89-16CA851D5762}">
   <ds:schemaRefs>
     <ds:schemaRef ds:uri="http://schemas.microsoft.com/office/2006/metadata/contentType"/>
@@ -8965,4 +9688,29 @@
     <ds:schemaRef ds:uri="http://schemas.microsoft.com/internal/obd"/>
   </ds:schemaRefs>
 </ds:datastoreItem>
+</file>
+
+<file path=customXml/itemProps2.xml><?xml version="1.0" encoding="utf-8"?>
+<ds:datastoreItem xmlns:ds="http://schemas.openxmlformats.org/officeDocument/2006/customXml" ds:itemID="{24B6D469-2EE5-4294-AD1E-F96757AC7F57}">
+  <ds:schemaRefs>
+    <ds:schemaRef ds:uri="http://schemas.microsoft.com/sharepoint/v3/contenttype/forms"/>
+  </ds:schemaRefs>
+</ds:datastoreItem>
+</file>
+
+<file path=customXml/itemProps3.xml><?xml version="1.0" encoding="utf-8"?>
+<ds:datastoreItem xmlns:ds="http://schemas.openxmlformats.org/officeDocument/2006/customXml" ds:itemID="{2E62BA38-5CD8-4CF6-B14C-B5E0E849EECA}">
+  <ds:schemaRefs>
+    <ds:schemaRef ds:uri="http://schemas.microsoft.com/office/2006/documentManagement/types"/>
+    <ds:schemaRef ds:uri="1dedc83c-9b83-4e9e-a3ee-ea7e82b4a201"/>
+    <ds:schemaRef ds:uri="http://schemas.microsoft.com/office/2006/metadata/properties"/>
+    <ds:schemaRef ds:uri="http://purl.org/dc/terms/"/>
+    <ds:schemaRef ds:uri="http://purl.org/dc/dcmitype/"/>
+    <ds:schemaRef ds:uri="http://schemas.openxmlformats.org/package/2006/metadata/core-properties"/>
+    <ds:schemaRef ds:uri="http://schemas.microsoft.com/office/infopath/2007/PartnerControls"/>
+    <ds:schemaRef ds:uri="2c13b40f-93e8-44d0-9439-bff2a3aff2ef"/>
+    <ds:schemaRef ds:uri="http://www.w3.org/XML/1998/namespace"/>
+    <ds:schemaRef ds:uri="http://purl.org/dc/elements/1.1/"/>
+  </ds:schemaRefs>
+</ds:datastoreItem>
 </file>
</xml_diff>